<commit_message>
Convert labs to PowerPoint.
Add new labs covering device drivers and kernel services
Split communication lab into two pieces.
Split storage lab into two pieces.
</commit_message>
<xml_diff>
--- a/undergraduate/lectures/introduction.pptx
+++ b/undergraduate/lectures/introduction.pptx
@@ -5,7 +5,7 @@
     <p:sldMasterId id="2147483786" r:id="rId1"/>
   </p:sldMasterIdLst>
   <p:notesMasterIdLst>
-    <p:notesMasterId r:id="rId42"/>
+    <p:notesMasterId r:id="rId53"/>
   </p:notesMasterIdLst>
   <p:sldIdLst>
     <p:sldId id="256" r:id="rId2"/>
@@ -23,31 +23,42 @@
     <p:sldId id="272" r:id="rId14"/>
     <p:sldId id="273" r:id="rId15"/>
     <p:sldId id="264" r:id="rId16"/>
-    <p:sldId id="265" r:id="rId17"/>
-    <p:sldId id="274" r:id="rId18"/>
-    <p:sldId id="275" r:id="rId19"/>
-    <p:sldId id="276" r:id="rId20"/>
-    <p:sldId id="277" r:id="rId21"/>
-    <p:sldId id="278" r:id="rId22"/>
-    <p:sldId id="279" r:id="rId23"/>
-    <p:sldId id="280" r:id="rId24"/>
-    <p:sldId id="281" r:id="rId25"/>
-    <p:sldId id="282" r:id="rId26"/>
-    <p:sldId id="283" r:id="rId27"/>
-    <p:sldId id="284" r:id="rId28"/>
-    <p:sldId id="285" r:id="rId29"/>
-    <p:sldId id="286" r:id="rId30"/>
-    <p:sldId id="287" r:id="rId31"/>
-    <p:sldId id="288" r:id="rId32"/>
-    <p:sldId id="289" r:id="rId33"/>
-    <p:sldId id="290" r:id="rId34"/>
-    <p:sldId id="291" r:id="rId35"/>
-    <p:sldId id="292" r:id="rId36"/>
-    <p:sldId id="293" r:id="rId37"/>
-    <p:sldId id="294" r:id="rId38"/>
-    <p:sldId id="295" r:id="rId39"/>
-    <p:sldId id="296" r:id="rId40"/>
-    <p:sldId id="297" r:id="rId41"/>
+    <p:sldId id="298" r:id="rId17"/>
+    <p:sldId id="300" r:id="rId18"/>
+    <p:sldId id="302" r:id="rId19"/>
+    <p:sldId id="301" r:id="rId20"/>
+    <p:sldId id="305" r:id="rId21"/>
+    <p:sldId id="303" r:id="rId22"/>
+    <p:sldId id="304" r:id="rId23"/>
+    <p:sldId id="299" r:id="rId24"/>
+    <p:sldId id="306" r:id="rId25"/>
+    <p:sldId id="307" r:id="rId26"/>
+    <p:sldId id="308" r:id="rId27"/>
+    <p:sldId id="265" r:id="rId28"/>
+    <p:sldId id="274" r:id="rId29"/>
+    <p:sldId id="275" r:id="rId30"/>
+    <p:sldId id="276" r:id="rId31"/>
+    <p:sldId id="277" r:id="rId32"/>
+    <p:sldId id="278" r:id="rId33"/>
+    <p:sldId id="279" r:id="rId34"/>
+    <p:sldId id="280" r:id="rId35"/>
+    <p:sldId id="281" r:id="rId36"/>
+    <p:sldId id="282" r:id="rId37"/>
+    <p:sldId id="283" r:id="rId38"/>
+    <p:sldId id="284" r:id="rId39"/>
+    <p:sldId id="285" r:id="rId40"/>
+    <p:sldId id="286" r:id="rId41"/>
+    <p:sldId id="287" r:id="rId42"/>
+    <p:sldId id="288" r:id="rId43"/>
+    <p:sldId id="289" r:id="rId44"/>
+    <p:sldId id="290" r:id="rId45"/>
+    <p:sldId id="291" r:id="rId46"/>
+    <p:sldId id="292" r:id="rId47"/>
+    <p:sldId id="293" r:id="rId48"/>
+    <p:sldId id="294" r:id="rId49"/>
+    <p:sldId id="295" r:id="rId50"/>
+    <p:sldId id="296" r:id="rId51"/>
+    <p:sldId id="297" r:id="rId52"/>
   </p:sldIdLst>
   <p:sldSz cx="12192000" cy="6858000"/>
   <p:notesSz cx="6858000" cy="9144000"/>
@@ -174,6 +185,17 @@
             <p14:sldId id="272"/>
             <p14:sldId id="273"/>
             <p14:sldId id="264"/>
+            <p14:sldId id="298"/>
+            <p14:sldId id="300"/>
+            <p14:sldId id="302"/>
+            <p14:sldId id="301"/>
+            <p14:sldId id="305"/>
+            <p14:sldId id="303"/>
+            <p14:sldId id="304"/>
+            <p14:sldId id="299"/>
+            <p14:sldId id="306"/>
+            <p14:sldId id="307"/>
+            <p14:sldId id="308"/>
             <p14:sldId id="265"/>
           </p14:sldIdLst>
         </p14:section>
@@ -303,7 +325,7 @@
           <a:p>
             <a:fld id="{EC53E720-1243-6043-B4C4-6E31C619CC0A}" type="datetimeFigureOut">
               <a:rPr lang="en-US" smtClean="0"/>
-              <a:t>2/2/17</a:t>
+              <a:t>2/4/17</a:t>
             </a:fld>
             <a:endParaRPr lang="en-US"/>
           </a:p>
@@ -970,7 +992,7 @@
           <a:p>
             <a:fld id="{95DA03C6-6B2A-3D4E-ACBF-63391107FCA5}" type="datetime1">
               <a:rPr lang="en-US" smtClean="0"/>
-              <a:t>2/2/17</a:t>
+              <a:t>2/4/17</a:t>
             </a:fld>
             <a:endParaRPr lang="en-US"/>
           </a:p>
@@ -1249,7 +1271,7 @@
           <a:p>
             <a:fld id="{652B615D-AC37-794B-9CD1-917BECA41F70}" type="datetime1">
               <a:rPr lang="en-US" smtClean="0"/>
-              <a:t>2/2/17</a:t>
+              <a:t>2/4/17</a:t>
             </a:fld>
             <a:endParaRPr lang="en-US"/>
           </a:p>
@@ -1504,7 +1526,7 @@
           <a:p>
             <a:fld id="{5DC51015-F320-0A4F-959E-3D859876C438}" type="datetime1">
               <a:rPr lang="en-US" smtClean="0"/>
-              <a:t>2/2/17</a:t>
+              <a:t>2/4/17</a:t>
             </a:fld>
             <a:endParaRPr lang="en-US"/>
           </a:p>
@@ -1682,7 +1704,7 @@
           <a:p>
             <a:fld id="{4B1B9092-98F8-3943-8253-FED67AD371E9}" type="datetime1">
               <a:rPr lang="en-US" smtClean="0"/>
-              <a:t>2/2/17</a:t>
+              <a:t>2/4/17</a:t>
             </a:fld>
             <a:endParaRPr lang="en-US"/>
           </a:p>
@@ -2031,7 +2053,7 @@
           <a:p>
             <a:fld id="{28960D5E-7767-5B4E-BF7E-AE3C5D61F3FF}" type="datetime1">
               <a:rPr lang="en-US" smtClean="0"/>
-              <a:t>2/2/17</a:t>
+              <a:t>2/4/17</a:t>
             </a:fld>
             <a:endParaRPr lang="en-US"/>
           </a:p>
@@ -2325,7 +2347,7 @@
           <a:p>
             <a:fld id="{416A0E0A-1609-FB44-8228-EEF5C54B5A55}" type="datetime1">
               <a:rPr lang="en-US" smtClean="0"/>
-              <a:t>2/2/17</a:t>
+              <a:t>2/4/17</a:t>
             </a:fld>
             <a:endParaRPr lang="en-US" dirty="0"/>
           </a:p>
@@ -2712,7 +2734,7 @@
           <a:p>
             <a:fld id="{8D566A62-F6F0-FB4F-9669-760CD9DCEC73}" type="datetime1">
               <a:rPr lang="en-US" smtClean="0"/>
-              <a:t>2/2/17</a:t>
+              <a:t>2/4/17</a:t>
             </a:fld>
             <a:endParaRPr lang="en-US"/>
           </a:p>
@@ -2836,7 +2858,7 @@
           <a:p>
             <a:fld id="{6B34C88A-1865-1F43-A0DB-344805F7492E}" type="datetime1">
               <a:rPr lang="en-US" smtClean="0"/>
-              <a:t>2/2/17</a:t>
+              <a:t>2/4/17</a:t>
             </a:fld>
             <a:endParaRPr lang="en-US"/>
           </a:p>
@@ -3013,7 +3035,7 @@
           <a:p>
             <a:fld id="{8B4004B4-FF14-FF4D-B044-59094E9AC0F1}" type="datetime1">
               <a:rPr lang="en-US" smtClean="0"/>
-              <a:t>2/2/17</a:t>
+              <a:t>2/4/17</a:t>
             </a:fld>
             <a:endParaRPr lang="en-US"/>
           </a:p>
@@ -3373,7 +3395,7 @@
           <a:p>
             <a:fld id="{862984A0-B2F5-2549-A24F-764B1F76A93B}" type="datetime1">
               <a:rPr lang="en-US" smtClean="0"/>
-              <a:t>2/2/17</a:t>
+              <a:t>2/4/17</a:t>
             </a:fld>
             <a:endParaRPr lang="en-US"/>
           </a:p>
@@ -3758,7 +3780,7 @@
           <a:p>
             <a:fld id="{6F310967-D635-1C4B-8010-EE130F91BB63}" type="datetime1">
               <a:rPr lang="en-US" smtClean="0"/>
-              <a:t>2/2/17</a:t>
+              <a:t>2/4/17</a:t>
             </a:fld>
             <a:endParaRPr lang="en-US"/>
           </a:p>
@@ -4044,7 +4066,7 @@
           <a:p>
             <a:fld id="{B27188E3-ED48-3E43-BB72-DB8091BEB4A5}" type="datetime1">
               <a:rPr lang="en-US" smtClean="0"/>
-              <a:t>2/2/17</a:t>
+              <a:t>2/4/17</a:t>
             </a:fld>
             <a:endParaRPr lang="en-US" dirty="0"/>
           </a:p>
@@ -6331,6 +6353,2137 @@
           <a:p>
             <a:r>
               <a:rPr lang="en-US" dirty="0" smtClean="0"/>
+              <a:t>Performance Measures</a:t>
+            </a:r>
+            <a:endParaRPr lang="en-US" dirty="0"/>
+          </a:p>
+        </p:txBody>
+      </p:sp>
+      <p:sp>
+        <p:nvSpPr>
+          <p:cNvPr id="3" name="Content Placeholder 2"/>
+          <p:cNvSpPr>
+            <a:spLocks noGrp="1"/>
+          </p:cNvSpPr>
+          <p:nvPr>
+            <p:ph idx="1"/>
+          </p:nvPr>
+        </p:nvSpPr>
+        <p:spPr/>
+        <p:txBody>
+          <a:bodyPr/>
+          <a:lstStyle/>
+          <a:p>
+            <a:r>
+              <a:rPr lang="en-US" dirty="0" smtClean="0"/>
+              <a:t>Throughput</a:t>
+            </a:r>
+          </a:p>
+          <a:p>
+            <a:pPr lvl="1"/>
+            <a:r>
+              <a:rPr lang="en-US" dirty="0" smtClean="0"/>
+              <a:t>How much work can we do per unit time?</a:t>
+            </a:r>
+          </a:p>
+          <a:p>
+            <a:r>
+              <a:rPr lang="en-US" dirty="0" smtClean="0"/>
+              <a:t>Latency</a:t>
+            </a:r>
+          </a:p>
+          <a:p>
+            <a:pPr lvl="1"/>
+            <a:r>
+              <a:rPr lang="en-US" dirty="0" smtClean="0"/>
+              <a:t>Time between request and useful response</a:t>
+            </a:r>
+          </a:p>
+          <a:p>
+            <a:r>
+              <a:rPr lang="en-US" dirty="0" smtClean="0"/>
+              <a:t>Jitter</a:t>
+            </a:r>
+          </a:p>
+          <a:p>
+            <a:pPr lvl="1"/>
+            <a:r>
+              <a:rPr lang="en-US" dirty="0" smtClean="0"/>
+              <a:t>Variability in latency</a:t>
+            </a:r>
+            <a:endParaRPr lang="en-US" dirty="0"/>
+          </a:p>
+        </p:txBody>
+      </p:sp>
+      <p:sp>
+        <p:nvSpPr>
+          <p:cNvPr id="4" name="Footer Placeholder 3"/>
+          <p:cNvSpPr>
+            <a:spLocks noGrp="1"/>
+          </p:cNvSpPr>
+          <p:nvPr>
+            <p:ph type="ftr" sz="quarter" idx="11"/>
+          </p:nvPr>
+        </p:nvSpPr>
+        <p:spPr/>
+        <p:txBody>
+          <a:bodyPr/>
+          <a:lstStyle/>
+          <a:p>
+            <a:r>
+              <a:rPr lang="en-US" smtClean="0"/>
+              <a:t>Introduction to Operating Systems</a:t>
+            </a:r>
+            <a:endParaRPr lang="en-US" dirty="0"/>
+          </a:p>
+        </p:txBody>
+      </p:sp>
+    </p:spTree>
+    <p:extLst>
+      <p:ext uri="{BB962C8B-B14F-4D97-AF65-F5344CB8AC3E}">
+        <p14:creationId xmlns:p14="http://schemas.microsoft.com/office/powerpoint/2010/main" val="1569544639"/>
+      </p:ext>
+    </p:extLst>
+  </p:cSld>
+  <p:clrMapOvr>
+    <a:masterClrMapping/>
+  </p:clrMapOvr>
+</p:sld>
+</file>
+
+<file path=ppt/slides/slide17.xml><?xml version="1.0" encoding="utf-8"?>
+<p:sld xmlns:a="http://schemas.openxmlformats.org/drawingml/2006/main" xmlns:r="http://schemas.openxmlformats.org/officeDocument/2006/relationships" xmlns:p="http://schemas.openxmlformats.org/presentationml/2006/main">
+  <p:cSld>
+    <p:spTree>
+      <p:nvGrpSpPr>
+        <p:cNvPr id="1" name=""/>
+        <p:cNvGrpSpPr/>
+        <p:nvPr/>
+      </p:nvGrpSpPr>
+      <p:grpSpPr>
+        <a:xfrm>
+          <a:off x="0" y="0"/>
+          <a:ext cx="0" cy="0"/>
+          <a:chOff x="0" y="0"/>
+          <a:chExt cx="0" cy="0"/>
+        </a:xfrm>
+      </p:grpSpPr>
+      <p:sp>
+        <p:nvSpPr>
+          <p:cNvPr id="2" name="Title 1"/>
+          <p:cNvSpPr>
+            <a:spLocks noGrp="1"/>
+          </p:cNvSpPr>
+          <p:nvPr>
+            <p:ph type="title"/>
+          </p:nvPr>
+        </p:nvSpPr>
+        <p:spPr/>
+        <p:txBody>
+          <a:bodyPr/>
+          <a:lstStyle/>
+          <a:p>
+            <a:r>
+              <a:rPr lang="en-US" dirty="0" smtClean="0"/>
+              <a:t>Throughput</a:t>
+            </a:r>
+            <a:endParaRPr lang="en-US" dirty="0"/>
+          </a:p>
+        </p:txBody>
+      </p:sp>
+      <p:sp>
+        <p:nvSpPr>
+          <p:cNvPr id="3" name="Content Placeholder 2"/>
+          <p:cNvSpPr>
+            <a:spLocks noGrp="1"/>
+          </p:cNvSpPr>
+          <p:nvPr>
+            <p:ph idx="1"/>
+          </p:nvPr>
+        </p:nvSpPr>
+        <p:spPr/>
+        <p:txBody>
+          <a:bodyPr/>
+          <a:lstStyle/>
+          <a:p>
+            <a:r>
+              <a:rPr lang="en-US" dirty="0" smtClean="0"/>
+              <a:t>Everyone knows this one</a:t>
+            </a:r>
+          </a:p>
+          <a:p>
+            <a:r>
+              <a:rPr lang="en-US" dirty="0" smtClean="0"/>
+              <a:t>Data moved</a:t>
+            </a:r>
+          </a:p>
+          <a:p>
+            <a:pPr lvl="1"/>
+            <a:r>
+              <a:rPr lang="en-US" dirty="0" smtClean="0"/>
+              <a:t>100 Mbps</a:t>
+            </a:r>
+          </a:p>
+          <a:p>
+            <a:r>
+              <a:rPr lang="en-US" dirty="0" smtClean="0"/>
+              <a:t>Operations or Transactions Performed</a:t>
+            </a:r>
+          </a:p>
+          <a:p>
+            <a:r>
+              <a:rPr lang="en-US" dirty="0" smtClean="0"/>
+              <a:t>Increase Frequency</a:t>
+            </a:r>
+          </a:p>
+          <a:p>
+            <a:r>
+              <a:rPr lang="en-US" dirty="0" smtClean="0"/>
+              <a:t>Widen the bus</a:t>
+            </a:r>
+          </a:p>
+          <a:p>
+            <a:endParaRPr lang="en-US" dirty="0"/>
+          </a:p>
+        </p:txBody>
+      </p:sp>
+      <p:sp>
+        <p:nvSpPr>
+          <p:cNvPr id="4" name="Footer Placeholder 3"/>
+          <p:cNvSpPr>
+            <a:spLocks noGrp="1"/>
+          </p:cNvSpPr>
+          <p:nvPr>
+            <p:ph type="ftr" sz="quarter" idx="11"/>
+          </p:nvPr>
+        </p:nvSpPr>
+        <p:spPr/>
+        <p:txBody>
+          <a:bodyPr/>
+          <a:lstStyle/>
+          <a:p>
+            <a:r>
+              <a:rPr lang="en-US" smtClean="0"/>
+              <a:t>Introduction to Operating Systems</a:t>
+            </a:r>
+            <a:endParaRPr lang="en-US" dirty="0"/>
+          </a:p>
+        </p:txBody>
+      </p:sp>
+    </p:spTree>
+    <p:extLst>
+      <p:ext uri="{BB962C8B-B14F-4D97-AF65-F5344CB8AC3E}">
+        <p14:creationId xmlns:p14="http://schemas.microsoft.com/office/powerpoint/2010/main" val="2087233619"/>
+      </p:ext>
+    </p:extLst>
+  </p:cSld>
+  <p:clrMapOvr>
+    <a:masterClrMapping/>
+  </p:clrMapOvr>
+</p:sld>
+</file>
+
+<file path=ppt/slides/slide18.xml><?xml version="1.0" encoding="utf-8"?>
+<p:sld xmlns:a="http://schemas.openxmlformats.org/drawingml/2006/main" xmlns:r="http://schemas.openxmlformats.org/officeDocument/2006/relationships" xmlns:p="http://schemas.openxmlformats.org/presentationml/2006/main">
+  <p:cSld>
+    <p:spTree>
+      <p:nvGrpSpPr>
+        <p:cNvPr id="1" name=""/>
+        <p:cNvGrpSpPr/>
+        <p:nvPr/>
+      </p:nvGrpSpPr>
+      <p:grpSpPr>
+        <a:xfrm>
+          <a:off x="0" y="0"/>
+          <a:ext cx="0" cy="0"/>
+          <a:chOff x="0" y="0"/>
+          <a:chExt cx="0" cy="0"/>
+        </a:xfrm>
+      </p:grpSpPr>
+      <p:sp>
+        <p:nvSpPr>
+          <p:cNvPr id="2" name="Title 1"/>
+          <p:cNvSpPr>
+            <a:spLocks noGrp="1"/>
+          </p:cNvSpPr>
+          <p:nvPr>
+            <p:ph type="title"/>
+          </p:nvPr>
+        </p:nvSpPr>
+        <p:spPr/>
+        <p:txBody>
+          <a:bodyPr/>
+          <a:lstStyle/>
+          <a:p>
+            <a:r>
+              <a:rPr lang="en-US" dirty="0" smtClean="0"/>
+              <a:t>Who cares about throughput?</a:t>
+            </a:r>
+            <a:endParaRPr lang="en-US" dirty="0"/>
+          </a:p>
+        </p:txBody>
+      </p:sp>
+      <p:sp>
+        <p:nvSpPr>
+          <p:cNvPr id="3" name="Content Placeholder 2"/>
+          <p:cNvSpPr>
+            <a:spLocks noGrp="1"/>
+          </p:cNvSpPr>
+          <p:nvPr>
+            <p:ph idx="1"/>
+          </p:nvPr>
+        </p:nvSpPr>
+        <p:spPr/>
+        <p:txBody>
+          <a:bodyPr/>
+          <a:lstStyle/>
+          <a:p>
+            <a:r>
+              <a:rPr lang="en-US" dirty="0" smtClean="0"/>
+              <a:t>Everyone!</a:t>
+            </a:r>
+          </a:p>
+          <a:p>
+            <a:r>
+              <a:rPr lang="en-US" dirty="0" smtClean="0"/>
+              <a:t>Video Streaming</a:t>
+            </a:r>
+          </a:p>
+          <a:p>
+            <a:pPr lvl="1"/>
+            <a:r>
+              <a:rPr lang="en-US" dirty="0" smtClean="0"/>
+              <a:t>Cat videos!</a:t>
+            </a:r>
+          </a:p>
+          <a:p>
+            <a:r>
+              <a:rPr lang="en-US" dirty="0" smtClean="0"/>
+              <a:t>Database Systems</a:t>
+            </a:r>
+          </a:p>
+          <a:p>
+            <a:pPr lvl="1"/>
+            <a:r>
+              <a:rPr lang="en-US" dirty="0" smtClean="0"/>
+              <a:t>Transaction processing</a:t>
+            </a:r>
+          </a:p>
+          <a:p>
+            <a:r>
+              <a:rPr lang="en-US" dirty="0" smtClean="0"/>
+              <a:t>Any form of data processing</a:t>
+            </a:r>
+          </a:p>
+          <a:p>
+            <a:pPr lvl="1"/>
+            <a:r>
+              <a:rPr lang="en-US" dirty="0" smtClean="0"/>
+              <a:t>Image manipulation</a:t>
+            </a:r>
+          </a:p>
+          <a:p>
+            <a:pPr lvl="1"/>
+            <a:r>
+              <a:rPr lang="en-US" dirty="0" smtClean="0"/>
+              <a:t>Machine Learning</a:t>
+            </a:r>
+          </a:p>
+          <a:p>
+            <a:pPr lvl="1"/>
+            <a:endParaRPr lang="en-US" dirty="0" smtClean="0"/>
+          </a:p>
+          <a:p>
+            <a:endParaRPr lang="en-US" dirty="0" smtClean="0"/>
+          </a:p>
+          <a:p>
+            <a:endParaRPr lang="en-US" dirty="0"/>
+          </a:p>
+        </p:txBody>
+      </p:sp>
+      <p:sp>
+        <p:nvSpPr>
+          <p:cNvPr id="4" name="Footer Placeholder 3"/>
+          <p:cNvSpPr>
+            <a:spLocks noGrp="1"/>
+          </p:cNvSpPr>
+          <p:nvPr>
+            <p:ph type="ftr" sz="quarter" idx="11"/>
+          </p:nvPr>
+        </p:nvSpPr>
+        <p:spPr/>
+        <p:txBody>
+          <a:bodyPr/>
+          <a:lstStyle/>
+          <a:p>
+            <a:r>
+              <a:rPr lang="en-US" smtClean="0"/>
+              <a:t>Introduction to Operating Systems</a:t>
+            </a:r>
+            <a:endParaRPr lang="en-US" dirty="0"/>
+          </a:p>
+        </p:txBody>
+      </p:sp>
+      <p:pic>
+        <p:nvPicPr>
+          <p:cNvPr id="5" name="Picture 4"/>
+          <p:cNvPicPr>
+            <a:picLocks noChangeAspect="1"/>
+          </p:cNvPicPr>
+          <p:nvPr/>
+        </p:nvPicPr>
+        <p:blipFill>
+          <a:blip r:embed="rId2">
+            <a:extLst>
+              <a:ext uri="{28A0092B-C50C-407E-A947-70E740481C1C}">
+                <a14:useLocalDpi xmlns:a14="http://schemas.microsoft.com/office/drawing/2010/main" val="0"/>
+              </a:ext>
+            </a:extLst>
+          </a:blip>
+          <a:stretch>
+            <a:fillRect/>
+          </a:stretch>
+        </p:blipFill>
+        <p:spPr>
+          <a:xfrm>
+            <a:off x="7521462" y="1581989"/>
+            <a:ext cx="3634218" cy="2043713"/>
+          </a:xfrm>
+          <a:prstGeom prst="rect">
+            <a:avLst/>
+          </a:prstGeom>
+        </p:spPr>
+      </p:pic>
+    </p:spTree>
+    <p:extLst>
+      <p:ext uri="{BB962C8B-B14F-4D97-AF65-F5344CB8AC3E}">
+        <p14:creationId xmlns:p14="http://schemas.microsoft.com/office/powerpoint/2010/main" val="706397372"/>
+      </p:ext>
+    </p:extLst>
+  </p:cSld>
+  <p:clrMapOvr>
+    <a:masterClrMapping/>
+  </p:clrMapOvr>
+  <p:timing>
+    <p:tnLst>
+      <p:par>
+        <p:cTn id="1" dur="indefinite" restart="never" nodeType="tmRoot"/>
+      </p:par>
+    </p:tnLst>
+  </p:timing>
+</p:sld>
+</file>
+
+<file path=ppt/slides/slide19.xml><?xml version="1.0" encoding="utf-8"?>
+<p:sld xmlns:a="http://schemas.openxmlformats.org/drawingml/2006/main" xmlns:r="http://schemas.openxmlformats.org/officeDocument/2006/relationships" xmlns:p="http://schemas.openxmlformats.org/presentationml/2006/main">
+  <p:cSld>
+    <p:spTree>
+      <p:nvGrpSpPr>
+        <p:cNvPr id="1" name=""/>
+        <p:cNvGrpSpPr/>
+        <p:nvPr/>
+      </p:nvGrpSpPr>
+      <p:grpSpPr>
+        <a:xfrm>
+          <a:off x="0" y="0"/>
+          <a:ext cx="0" cy="0"/>
+          <a:chOff x="0" y="0"/>
+          <a:chExt cx="0" cy="0"/>
+        </a:xfrm>
+      </p:grpSpPr>
+      <p:sp>
+        <p:nvSpPr>
+          <p:cNvPr id="2" name="Title 1"/>
+          <p:cNvSpPr>
+            <a:spLocks noGrp="1"/>
+          </p:cNvSpPr>
+          <p:nvPr>
+            <p:ph type="title"/>
+          </p:nvPr>
+        </p:nvSpPr>
+        <p:spPr/>
+        <p:txBody>
+          <a:bodyPr/>
+          <a:lstStyle/>
+          <a:p>
+            <a:r>
+              <a:rPr lang="en-US" dirty="0" smtClean="0"/>
+              <a:t>Latency</a:t>
+            </a:r>
+            <a:endParaRPr lang="en-US" dirty="0"/>
+          </a:p>
+        </p:txBody>
+      </p:sp>
+      <p:sp>
+        <p:nvSpPr>
+          <p:cNvPr id="3" name="Content Placeholder 2"/>
+          <p:cNvSpPr>
+            <a:spLocks noGrp="1"/>
+          </p:cNvSpPr>
+          <p:nvPr>
+            <p:ph idx="1"/>
+          </p:nvPr>
+        </p:nvSpPr>
+        <p:spPr/>
+        <p:txBody>
+          <a:bodyPr/>
+          <a:lstStyle/>
+          <a:p>
+            <a:pPr marL="0" marR="0" lvl="0" indent="0" defTabSz="914400" eaLnBrk="1" fontAlgn="auto" latinLnBrk="0" hangingPunct="1">
+              <a:lnSpc>
+                <a:spcPct val="100000"/>
+              </a:lnSpc>
+              <a:spcBef>
+                <a:spcPts val="0"/>
+              </a:spcBef>
+              <a:spcAft>
+                <a:spcPts val="0"/>
+              </a:spcAft>
+              <a:buClrTx/>
+              <a:buSzTx/>
+              <a:buFontTx/>
+              <a:buNone/>
+              <a:tabLst/>
+              <a:defRPr/>
+            </a:pPr>
+            <a:r>
+              <a:rPr lang="en-US" dirty="0" smtClean="0"/>
+              <a:t>Request to response</a:t>
+            </a:r>
+          </a:p>
+          <a:p>
+            <a:pPr marL="0" marR="0" lvl="0" indent="0" defTabSz="914400" eaLnBrk="1" fontAlgn="auto" latinLnBrk="0" hangingPunct="1">
+              <a:lnSpc>
+                <a:spcPct val="100000"/>
+              </a:lnSpc>
+              <a:spcBef>
+                <a:spcPts val="0"/>
+              </a:spcBef>
+              <a:spcAft>
+                <a:spcPts val="0"/>
+              </a:spcAft>
+              <a:buClrTx/>
+              <a:buSzTx/>
+              <a:buFontTx/>
+              <a:buNone/>
+              <a:tabLst/>
+              <a:defRPr/>
+            </a:pPr>
+            <a:r>
+              <a:rPr lang="en-US" dirty="0" smtClean="0"/>
+              <a:t>Governed by physical constants</a:t>
+            </a:r>
+          </a:p>
+          <a:p>
+            <a:pPr marL="0" marR="0" lvl="0" indent="0" defTabSz="914400" eaLnBrk="1" fontAlgn="auto" latinLnBrk="0" hangingPunct="1">
+              <a:lnSpc>
+                <a:spcPct val="100000"/>
+              </a:lnSpc>
+              <a:spcBef>
+                <a:spcPts val="0"/>
+              </a:spcBef>
+              <a:spcAft>
+                <a:spcPts val="0"/>
+              </a:spcAft>
+              <a:buClrTx/>
+              <a:buSzTx/>
+              <a:buFontTx/>
+              <a:buNone/>
+              <a:tabLst/>
+              <a:defRPr/>
+            </a:pPr>
+            <a:r>
+              <a:rPr lang="en-US" dirty="0"/>
+              <a:t>	</a:t>
+            </a:r>
+            <a:r>
+              <a:rPr lang="en-US" dirty="0" smtClean="0"/>
+              <a:t>The speed of light (c) matters</a:t>
+            </a:r>
+          </a:p>
+          <a:p>
+            <a:pPr marL="0" marR="0" lvl="0" indent="0" defTabSz="914400" eaLnBrk="1" fontAlgn="auto" latinLnBrk="0" hangingPunct="1">
+              <a:lnSpc>
+                <a:spcPct val="100000"/>
+              </a:lnSpc>
+              <a:spcBef>
+                <a:spcPts val="0"/>
+              </a:spcBef>
+              <a:spcAft>
+                <a:spcPts val="0"/>
+              </a:spcAft>
+              <a:buClrTx/>
+              <a:buSzTx/>
+              <a:buFontTx/>
+              <a:buNone/>
+              <a:tabLst/>
+              <a:defRPr/>
+            </a:pPr>
+            <a:r>
+              <a:rPr lang="en-US" dirty="0"/>
+              <a:t>	</a:t>
+            </a:r>
+            <a:r>
+              <a:rPr lang="en-US" dirty="0" smtClean="0"/>
+              <a:t>Rotational latency for spinning disks</a:t>
+            </a:r>
+          </a:p>
+          <a:p>
+            <a:pPr marL="0" marR="0" lvl="0" indent="0" defTabSz="914400" eaLnBrk="1" fontAlgn="auto" latinLnBrk="0" hangingPunct="1">
+              <a:lnSpc>
+                <a:spcPct val="100000"/>
+              </a:lnSpc>
+              <a:spcBef>
+                <a:spcPts val="0"/>
+              </a:spcBef>
+              <a:spcAft>
+                <a:spcPts val="0"/>
+              </a:spcAft>
+              <a:buClrTx/>
+              <a:buSzTx/>
+              <a:buFontTx/>
+              <a:buNone/>
+              <a:tabLst/>
+              <a:defRPr/>
+            </a:pPr>
+            <a:r>
+              <a:rPr lang="en-US" dirty="0" smtClean="0"/>
+              <a:t>CPU Caches</a:t>
+            </a:r>
+          </a:p>
+          <a:p>
+            <a:pPr marL="0" marR="0" lvl="0" indent="0" defTabSz="914400" eaLnBrk="1" fontAlgn="auto" latinLnBrk="0" hangingPunct="1">
+              <a:lnSpc>
+                <a:spcPct val="100000"/>
+              </a:lnSpc>
+              <a:spcBef>
+                <a:spcPts val="0"/>
+              </a:spcBef>
+              <a:spcAft>
+                <a:spcPts val="0"/>
+              </a:spcAft>
+              <a:buClrTx/>
+              <a:buSzTx/>
+              <a:buFontTx/>
+              <a:buNone/>
+              <a:tabLst/>
+              <a:defRPr/>
+            </a:pPr>
+            <a:r>
+              <a:rPr lang="en-US" dirty="0" smtClean="0"/>
+              <a:t>Memory flushes</a:t>
+            </a:r>
+          </a:p>
+          <a:p>
+            <a:pPr marL="0" marR="0" lvl="0" indent="0" defTabSz="914400" eaLnBrk="1" fontAlgn="auto" latinLnBrk="0" hangingPunct="1">
+              <a:lnSpc>
+                <a:spcPct val="100000"/>
+              </a:lnSpc>
+              <a:spcBef>
+                <a:spcPts val="0"/>
+              </a:spcBef>
+              <a:spcAft>
+                <a:spcPts val="0"/>
+              </a:spcAft>
+              <a:buClrTx/>
+              <a:buSzTx/>
+              <a:buFontTx/>
+              <a:buNone/>
+              <a:tabLst/>
+              <a:defRPr/>
+            </a:pPr>
+            <a:r>
+              <a:rPr lang="en-US" dirty="0" smtClean="0"/>
+              <a:t>Walking complicated data structures</a:t>
+            </a:r>
+          </a:p>
+          <a:p>
+            <a:pPr marL="0" marR="0" lvl="0" indent="0" defTabSz="914400" eaLnBrk="1" fontAlgn="auto" latinLnBrk="0" hangingPunct="1">
+              <a:lnSpc>
+                <a:spcPct val="100000"/>
+              </a:lnSpc>
+              <a:spcBef>
+                <a:spcPts val="0"/>
+              </a:spcBef>
+              <a:spcAft>
+                <a:spcPts val="0"/>
+              </a:spcAft>
+              <a:buClrTx/>
+              <a:buSzTx/>
+              <a:buFontTx/>
+              <a:buNone/>
+              <a:tabLst/>
+              <a:defRPr/>
+            </a:pPr>
+            <a:r>
+              <a:rPr lang="en-US" dirty="0" smtClean="0"/>
+              <a:t>Linear lists vs. hash tables</a:t>
+            </a:r>
+            <a:endParaRPr lang="en-US" dirty="0"/>
+          </a:p>
+        </p:txBody>
+      </p:sp>
+      <p:sp>
+        <p:nvSpPr>
+          <p:cNvPr id="4" name="Footer Placeholder 3"/>
+          <p:cNvSpPr>
+            <a:spLocks noGrp="1"/>
+          </p:cNvSpPr>
+          <p:nvPr>
+            <p:ph type="ftr" sz="quarter" idx="11"/>
+          </p:nvPr>
+        </p:nvSpPr>
+        <p:spPr/>
+        <p:txBody>
+          <a:bodyPr/>
+          <a:lstStyle/>
+          <a:p>
+            <a:r>
+              <a:rPr lang="en-US" smtClean="0"/>
+              <a:t>Introduction to Operating Systems</a:t>
+            </a:r>
+            <a:endParaRPr lang="en-US" dirty="0"/>
+          </a:p>
+        </p:txBody>
+      </p:sp>
+    </p:spTree>
+    <p:extLst>
+      <p:ext uri="{BB962C8B-B14F-4D97-AF65-F5344CB8AC3E}">
+        <p14:creationId xmlns:p14="http://schemas.microsoft.com/office/powerpoint/2010/main" val="1427152261"/>
+      </p:ext>
+    </p:extLst>
+  </p:cSld>
+  <p:clrMapOvr>
+    <a:masterClrMapping/>
+  </p:clrMapOvr>
+  <p:timing>
+    <p:tnLst>
+      <p:par>
+        <p:cTn id="1" dur="indefinite" restart="never" nodeType="tmRoot"/>
+      </p:par>
+    </p:tnLst>
+  </p:timing>
+</p:sld>
+</file>
+
+<file path=ppt/slides/slide2.xml><?xml version="1.0" encoding="utf-8"?>
+<p:sld xmlns:a="http://schemas.openxmlformats.org/drawingml/2006/main" xmlns:r="http://schemas.openxmlformats.org/officeDocument/2006/relationships" xmlns:p="http://schemas.openxmlformats.org/presentationml/2006/main">
+  <p:cSld>
+    <p:spTree>
+      <p:nvGrpSpPr>
+        <p:cNvPr id="1" name=""/>
+        <p:cNvGrpSpPr/>
+        <p:nvPr/>
+      </p:nvGrpSpPr>
+      <p:grpSpPr>
+        <a:xfrm>
+          <a:off x="0" y="0"/>
+          <a:ext cx="0" cy="0"/>
+          <a:chOff x="0" y="0"/>
+          <a:chExt cx="0" cy="0"/>
+        </a:xfrm>
+      </p:grpSpPr>
+      <p:sp>
+        <p:nvSpPr>
+          <p:cNvPr id="2" name="Title 1"/>
+          <p:cNvSpPr>
+            <a:spLocks noGrp="1"/>
+          </p:cNvSpPr>
+          <p:nvPr>
+            <p:ph type="title"/>
+          </p:nvPr>
+        </p:nvSpPr>
+        <p:spPr/>
+        <p:txBody>
+          <a:bodyPr/>
+          <a:lstStyle/>
+          <a:p>
+            <a:r>
+              <a:rPr lang="en-US" dirty="0" smtClean="0"/>
+              <a:t>Objectives</a:t>
+            </a:r>
+            <a:endParaRPr lang="en-US" dirty="0"/>
+          </a:p>
+        </p:txBody>
+      </p:sp>
+      <p:sp>
+        <p:nvSpPr>
+          <p:cNvPr id="3" name="Content Placeholder 2"/>
+          <p:cNvSpPr>
+            <a:spLocks noGrp="1"/>
+          </p:cNvSpPr>
+          <p:nvPr>
+            <p:ph idx="1"/>
+          </p:nvPr>
+        </p:nvSpPr>
+        <p:spPr/>
+        <p:txBody>
+          <a:bodyPr/>
+          <a:lstStyle/>
+          <a:p>
+            <a:r>
+              <a:rPr lang="en-US" dirty="0" smtClean="0"/>
+              <a:t>A </a:t>
+            </a:r>
+            <a:r>
+              <a:rPr lang="en-US" dirty="0"/>
+              <a:t>grounding in systems principles</a:t>
+            </a:r>
+          </a:p>
+          <a:p>
+            <a:r>
+              <a:rPr lang="en-US" dirty="0" smtClean="0"/>
+              <a:t>A </a:t>
+            </a:r>
+            <a:r>
+              <a:rPr lang="en-US" dirty="0"/>
+              <a:t>grand tour of the Operating System</a:t>
+            </a:r>
+          </a:p>
+          <a:p>
+            <a:r>
+              <a:rPr lang="en-US" dirty="0" smtClean="0"/>
+              <a:t>Practical </a:t>
+            </a:r>
+            <a:r>
+              <a:rPr lang="en-US" dirty="0"/>
+              <a:t>insights into how the OS works</a:t>
+            </a:r>
+          </a:p>
+        </p:txBody>
+      </p:sp>
+      <p:sp>
+        <p:nvSpPr>
+          <p:cNvPr id="5" name="Footer Placeholder 4"/>
+          <p:cNvSpPr>
+            <a:spLocks noGrp="1"/>
+          </p:cNvSpPr>
+          <p:nvPr>
+            <p:ph type="ftr" sz="quarter" idx="11"/>
+          </p:nvPr>
+        </p:nvSpPr>
+        <p:spPr/>
+        <p:txBody>
+          <a:bodyPr/>
+          <a:lstStyle/>
+          <a:p>
+            <a:r>
+              <a:rPr lang="en-US" smtClean="0"/>
+              <a:t>Introduction to Operating Systems</a:t>
+            </a:r>
+            <a:endParaRPr lang="en-US" dirty="0"/>
+          </a:p>
+        </p:txBody>
+      </p:sp>
+    </p:spTree>
+    <p:extLst>
+      <p:ext uri="{BB962C8B-B14F-4D97-AF65-F5344CB8AC3E}">
+        <p14:creationId xmlns:p14="http://schemas.microsoft.com/office/powerpoint/2010/main" val="1886148566"/>
+      </p:ext>
+    </p:extLst>
+  </p:cSld>
+  <p:clrMapOvr>
+    <a:masterClrMapping/>
+  </p:clrMapOvr>
+  <p:timing>
+    <p:tnLst>
+      <p:par>
+        <p:cTn id="1" dur="indefinite" restart="never" nodeType="tmRoot"/>
+      </p:par>
+    </p:tnLst>
+  </p:timing>
+</p:sld>
+</file>
+
+<file path=ppt/slides/slide20.xml><?xml version="1.0" encoding="utf-8"?>
+<p:sld xmlns:a="http://schemas.openxmlformats.org/drawingml/2006/main" xmlns:r="http://schemas.openxmlformats.org/officeDocument/2006/relationships" xmlns:p="http://schemas.openxmlformats.org/presentationml/2006/main">
+  <p:cSld>
+    <p:spTree>
+      <p:nvGrpSpPr>
+        <p:cNvPr id="1" name=""/>
+        <p:cNvGrpSpPr/>
+        <p:nvPr/>
+      </p:nvGrpSpPr>
+      <p:grpSpPr>
+        <a:xfrm>
+          <a:off x="0" y="0"/>
+          <a:ext cx="0" cy="0"/>
+          <a:chOff x="0" y="0"/>
+          <a:chExt cx="0" cy="0"/>
+        </a:xfrm>
+      </p:grpSpPr>
+      <p:sp>
+        <p:nvSpPr>
+          <p:cNvPr id="2" name="Title 1"/>
+          <p:cNvSpPr>
+            <a:spLocks noGrp="1"/>
+          </p:cNvSpPr>
+          <p:nvPr>
+            <p:ph type="title"/>
+          </p:nvPr>
+        </p:nvSpPr>
+        <p:spPr/>
+        <p:txBody>
+          <a:bodyPr/>
+          <a:lstStyle/>
+          <a:p>
+            <a:r>
+              <a:rPr lang="en-US" dirty="0" smtClean="0"/>
+              <a:t>Who cares about latency</a:t>
+            </a:r>
+            <a:endParaRPr lang="en-US" dirty="0"/>
+          </a:p>
+        </p:txBody>
+      </p:sp>
+      <p:sp>
+        <p:nvSpPr>
+          <p:cNvPr id="3" name="Content Placeholder 2"/>
+          <p:cNvSpPr>
+            <a:spLocks noGrp="1"/>
+          </p:cNvSpPr>
+          <p:nvPr>
+            <p:ph idx="1"/>
+          </p:nvPr>
+        </p:nvSpPr>
+        <p:spPr/>
+        <p:txBody>
+          <a:bodyPr/>
+          <a:lstStyle/>
+          <a:p>
+            <a:r>
+              <a:rPr lang="en-US" dirty="0" smtClean="0"/>
+              <a:t>Has a direct effect on throughput</a:t>
+            </a:r>
+          </a:p>
+          <a:p>
+            <a:r>
+              <a:rPr lang="en-US" dirty="0" smtClean="0"/>
+              <a:t>Increases system complexity</a:t>
+            </a:r>
+          </a:p>
+          <a:p>
+            <a:r>
+              <a:rPr lang="en-US" dirty="0" smtClean="0"/>
+              <a:t>Hard to avoid when working with real world systems</a:t>
+            </a:r>
+          </a:p>
+          <a:p>
+            <a:r>
+              <a:rPr lang="en-US" dirty="0" smtClean="0"/>
+              <a:t>Will be covered more fully in the Communication section</a:t>
+            </a:r>
+          </a:p>
+        </p:txBody>
+      </p:sp>
+      <p:sp>
+        <p:nvSpPr>
+          <p:cNvPr id="4" name="Footer Placeholder 3"/>
+          <p:cNvSpPr>
+            <a:spLocks noGrp="1"/>
+          </p:cNvSpPr>
+          <p:nvPr>
+            <p:ph type="ftr" sz="quarter" idx="11"/>
+          </p:nvPr>
+        </p:nvSpPr>
+        <p:spPr/>
+        <p:txBody>
+          <a:bodyPr/>
+          <a:lstStyle/>
+          <a:p>
+            <a:r>
+              <a:rPr lang="en-US" smtClean="0"/>
+              <a:t>Introduction to Operating Systems</a:t>
+            </a:r>
+            <a:endParaRPr lang="en-US" dirty="0"/>
+          </a:p>
+        </p:txBody>
+      </p:sp>
+    </p:spTree>
+    <p:extLst>
+      <p:ext uri="{BB962C8B-B14F-4D97-AF65-F5344CB8AC3E}">
+        <p14:creationId xmlns:p14="http://schemas.microsoft.com/office/powerpoint/2010/main" val="1406577408"/>
+      </p:ext>
+    </p:extLst>
+  </p:cSld>
+  <p:clrMapOvr>
+    <a:masterClrMapping/>
+  </p:clrMapOvr>
+</p:sld>
+</file>
+
+<file path=ppt/slides/slide21.xml><?xml version="1.0" encoding="utf-8"?>
+<p:sld xmlns:a="http://schemas.openxmlformats.org/drawingml/2006/main" xmlns:r="http://schemas.openxmlformats.org/officeDocument/2006/relationships" xmlns:p="http://schemas.openxmlformats.org/presentationml/2006/main">
+  <p:cSld>
+    <p:spTree>
+      <p:nvGrpSpPr>
+        <p:cNvPr id="1" name=""/>
+        <p:cNvGrpSpPr/>
+        <p:nvPr/>
+      </p:nvGrpSpPr>
+      <p:grpSpPr>
+        <a:xfrm>
+          <a:off x="0" y="0"/>
+          <a:ext cx="0" cy="0"/>
+          <a:chOff x="0" y="0"/>
+          <a:chExt cx="0" cy="0"/>
+        </a:xfrm>
+      </p:grpSpPr>
+      <p:sp>
+        <p:nvSpPr>
+          <p:cNvPr id="2" name="Title 1"/>
+          <p:cNvSpPr>
+            <a:spLocks noGrp="1"/>
+          </p:cNvSpPr>
+          <p:nvPr>
+            <p:ph type="title"/>
+          </p:nvPr>
+        </p:nvSpPr>
+        <p:spPr/>
+        <p:txBody>
+          <a:bodyPr/>
+          <a:lstStyle/>
+          <a:p>
+            <a:r>
+              <a:rPr lang="en-US" dirty="0" smtClean="0"/>
+              <a:t>Jitter</a:t>
+            </a:r>
+            <a:endParaRPr lang="en-US" dirty="0"/>
+          </a:p>
+        </p:txBody>
+      </p:sp>
+      <p:sp>
+        <p:nvSpPr>
+          <p:cNvPr id="6" name="Content Placeholder 5"/>
+          <p:cNvSpPr>
+            <a:spLocks noGrp="1"/>
+          </p:cNvSpPr>
+          <p:nvPr>
+            <p:ph idx="1"/>
+          </p:nvPr>
+        </p:nvSpPr>
+        <p:spPr/>
+        <p:txBody>
+          <a:bodyPr>
+            <a:normAutofit/>
+          </a:bodyPr>
+          <a:lstStyle/>
+          <a:p>
+            <a:r>
+              <a:rPr lang="en-US" sz="1200" dirty="0">
+                <a:latin typeface="Courier New" charset="0"/>
+                <a:ea typeface="Courier New" charset="0"/>
+                <a:cs typeface="Courier New" charset="0"/>
+              </a:rPr>
+              <a:t>PING </a:t>
+            </a:r>
+            <a:r>
+              <a:rPr lang="en-US" sz="1200" dirty="0" err="1">
+                <a:latin typeface="Courier New" charset="0"/>
+                <a:ea typeface="Courier New" charset="0"/>
+                <a:cs typeface="Courier New" charset="0"/>
+              </a:rPr>
+              <a:t>yahoo.com</a:t>
+            </a:r>
+            <a:r>
+              <a:rPr lang="en-US" sz="1200" dirty="0">
+                <a:latin typeface="Courier New" charset="0"/>
+                <a:ea typeface="Courier New" charset="0"/>
+                <a:cs typeface="Courier New" charset="0"/>
+              </a:rPr>
+              <a:t> (98.138.253.109): 56 data </a:t>
+            </a:r>
+            <a:r>
+              <a:rPr lang="en-US" sz="1200" dirty="0" smtClean="0">
+                <a:latin typeface="Courier New" charset="0"/>
+                <a:ea typeface="Courier New" charset="0"/>
+                <a:cs typeface="Courier New" charset="0"/>
+              </a:rPr>
+              <a:t>bytes</a:t>
+            </a:r>
+          </a:p>
+          <a:p>
+            <a:r>
+              <a:rPr lang="en-US" sz="1200" dirty="0" smtClean="0">
+                <a:latin typeface="Courier New" charset="0"/>
+                <a:ea typeface="Courier New" charset="0"/>
+                <a:cs typeface="Courier New" charset="0"/>
+              </a:rPr>
+              <a:t>64 </a:t>
+            </a:r>
+            <a:r>
+              <a:rPr lang="en-US" sz="1200" dirty="0">
+                <a:latin typeface="Courier New" charset="0"/>
+                <a:ea typeface="Courier New" charset="0"/>
+                <a:cs typeface="Courier New" charset="0"/>
+              </a:rPr>
+              <a:t>bytes from 98.138.253.109: </a:t>
+            </a:r>
+            <a:r>
+              <a:rPr lang="en-US" sz="1200" dirty="0" err="1">
+                <a:latin typeface="Courier New" charset="0"/>
+                <a:ea typeface="Courier New" charset="0"/>
+                <a:cs typeface="Courier New" charset="0"/>
+              </a:rPr>
+              <a:t>icmp_seq</a:t>
+            </a:r>
+            <a:r>
+              <a:rPr lang="en-US" sz="1200" dirty="0">
+                <a:latin typeface="Courier New" charset="0"/>
+                <a:ea typeface="Courier New" charset="0"/>
+                <a:cs typeface="Courier New" charset="0"/>
+              </a:rPr>
+              <a:t>=0 </a:t>
+            </a:r>
+            <a:r>
+              <a:rPr lang="en-US" sz="1200" dirty="0" err="1">
+                <a:latin typeface="Courier New" charset="0"/>
+                <a:ea typeface="Courier New" charset="0"/>
+                <a:cs typeface="Courier New" charset="0"/>
+              </a:rPr>
+              <a:t>ttl</a:t>
+            </a:r>
+            <a:r>
+              <a:rPr lang="en-US" sz="1200" dirty="0">
+                <a:latin typeface="Courier New" charset="0"/>
+                <a:ea typeface="Courier New" charset="0"/>
+                <a:cs typeface="Courier New" charset="0"/>
+              </a:rPr>
+              <a:t>=54 time=33.686 </a:t>
+            </a:r>
+            <a:r>
+              <a:rPr lang="en-US" sz="1200" dirty="0" err="1" smtClean="0">
+                <a:latin typeface="Courier New" charset="0"/>
+                <a:ea typeface="Courier New" charset="0"/>
+                <a:cs typeface="Courier New" charset="0"/>
+              </a:rPr>
+              <a:t>ms</a:t>
+            </a:r>
+            <a:endParaRPr lang="en-US" sz="1200" dirty="0" smtClean="0">
+              <a:latin typeface="Courier New" charset="0"/>
+              <a:ea typeface="Courier New" charset="0"/>
+              <a:cs typeface="Courier New" charset="0"/>
+            </a:endParaRPr>
+          </a:p>
+          <a:p>
+            <a:r>
+              <a:rPr lang="en-US" sz="1200" dirty="0" smtClean="0">
+                <a:latin typeface="Courier New" charset="0"/>
+                <a:ea typeface="Courier New" charset="0"/>
+                <a:cs typeface="Courier New" charset="0"/>
+              </a:rPr>
+              <a:t>64 </a:t>
+            </a:r>
+            <a:r>
+              <a:rPr lang="en-US" sz="1200" dirty="0">
+                <a:latin typeface="Courier New" charset="0"/>
+                <a:ea typeface="Courier New" charset="0"/>
+                <a:cs typeface="Courier New" charset="0"/>
+              </a:rPr>
+              <a:t>bytes from 98.138.253.109: </a:t>
+            </a:r>
+            <a:r>
+              <a:rPr lang="en-US" sz="1200" dirty="0" err="1">
+                <a:latin typeface="Courier New" charset="0"/>
+                <a:ea typeface="Courier New" charset="0"/>
+                <a:cs typeface="Courier New" charset="0"/>
+              </a:rPr>
+              <a:t>icmp_seq</a:t>
+            </a:r>
+            <a:r>
+              <a:rPr lang="en-US" sz="1200" dirty="0">
+                <a:latin typeface="Courier New" charset="0"/>
+                <a:ea typeface="Courier New" charset="0"/>
+                <a:cs typeface="Courier New" charset="0"/>
+              </a:rPr>
+              <a:t>=1 </a:t>
+            </a:r>
+            <a:r>
+              <a:rPr lang="en-US" sz="1200" dirty="0" err="1">
+                <a:latin typeface="Courier New" charset="0"/>
+                <a:ea typeface="Courier New" charset="0"/>
+                <a:cs typeface="Courier New" charset="0"/>
+              </a:rPr>
+              <a:t>ttl</a:t>
+            </a:r>
+            <a:r>
+              <a:rPr lang="en-US" sz="1200" dirty="0">
+                <a:latin typeface="Courier New" charset="0"/>
+                <a:ea typeface="Courier New" charset="0"/>
+                <a:cs typeface="Courier New" charset="0"/>
+              </a:rPr>
+              <a:t>=54 time=33.469 </a:t>
+            </a:r>
+            <a:r>
+              <a:rPr lang="en-US" sz="1200" dirty="0" err="1" smtClean="0">
+                <a:latin typeface="Courier New" charset="0"/>
+                <a:ea typeface="Courier New" charset="0"/>
+                <a:cs typeface="Courier New" charset="0"/>
+              </a:rPr>
+              <a:t>ms</a:t>
+            </a:r>
+            <a:endParaRPr lang="en-US" sz="1200" dirty="0" smtClean="0">
+              <a:latin typeface="Courier New" charset="0"/>
+              <a:ea typeface="Courier New" charset="0"/>
+              <a:cs typeface="Courier New" charset="0"/>
+            </a:endParaRPr>
+          </a:p>
+          <a:p>
+            <a:r>
+              <a:rPr lang="en-US" sz="1200" dirty="0" smtClean="0">
+                <a:latin typeface="Courier New" charset="0"/>
+                <a:ea typeface="Courier New" charset="0"/>
+                <a:cs typeface="Courier New" charset="0"/>
+              </a:rPr>
+              <a:t>64 </a:t>
+            </a:r>
+            <a:r>
+              <a:rPr lang="en-US" sz="1200" dirty="0">
+                <a:latin typeface="Courier New" charset="0"/>
+                <a:ea typeface="Courier New" charset="0"/>
+                <a:cs typeface="Courier New" charset="0"/>
+              </a:rPr>
+              <a:t>bytes from 98.138.253.109: </a:t>
+            </a:r>
+            <a:r>
+              <a:rPr lang="en-US" sz="1200" dirty="0" err="1">
+                <a:latin typeface="Courier New" charset="0"/>
+                <a:ea typeface="Courier New" charset="0"/>
+                <a:cs typeface="Courier New" charset="0"/>
+              </a:rPr>
+              <a:t>icmp_seq</a:t>
+            </a:r>
+            <a:r>
+              <a:rPr lang="en-US" sz="1200" dirty="0">
+                <a:latin typeface="Courier New" charset="0"/>
+                <a:ea typeface="Courier New" charset="0"/>
+                <a:cs typeface="Courier New" charset="0"/>
+              </a:rPr>
+              <a:t>=2 </a:t>
+            </a:r>
+            <a:r>
+              <a:rPr lang="en-US" sz="1200" dirty="0" err="1">
+                <a:latin typeface="Courier New" charset="0"/>
+                <a:ea typeface="Courier New" charset="0"/>
+                <a:cs typeface="Courier New" charset="0"/>
+              </a:rPr>
+              <a:t>ttl</a:t>
+            </a:r>
+            <a:r>
+              <a:rPr lang="en-US" sz="1200" dirty="0">
+                <a:latin typeface="Courier New" charset="0"/>
+                <a:ea typeface="Courier New" charset="0"/>
+                <a:cs typeface="Courier New" charset="0"/>
+              </a:rPr>
+              <a:t>=54 time=33.525 </a:t>
+            </a:r>
+            <a:r>
+              <a:rPr lang="en-US" sz="1200" dirty="0" err="1" smtClean="0">
+                <a:latin typeface="Courier New" charset="0"/>
+                <a:ea typeface="Courier New" charset="0"/>
+                <a:cs typeface="Courier New" charset="0"/>
+              </a:rPr>
+              <a:t>ms</a:t>
+            </a:r>
+            <a:endParaRPr lang="en-US" sz="1200" dirty="0" smtClean="0">
+              <a:latin typeface="Courier New" charset="0"/>
+              <a:ea typeface="Courier New" charset="0"/>
+              <a:cs typeface="Courier New" charset="0"/>
+            </a:endParaRPr>
+          </a:p>
+          <a:p>
+            <a:r>
+              <a:rPr lang="en-US" sz="1200" dirty="0" smtClean="0">
+                <a:latin typeface="Courier New" charset="0"/>
+                <a:ea typeface="Courier New" charset="0"/>
+                <a:cs typeface="Courier New" charset="0"/>
+              </a:rPr>
+              <a:t>64 </a:t>
+            </a:r>
+            <a:r>
+              <a:rPr lang="en-US" sz="1200" dirty="0">
+                <a:latin typeface="Courier New" charset="0"/>
+                <a:ea typeface="Courier New" charset="0"/>
+                <a:cs typeface="Courier New" charset="0"/>
+              </a:rPr>
+              <a:t>bytes from 98.138.253.109: </a:t>
+            </a:r>
+            <a:r>
+              <a:rPr lang="en-US" sz="1200" dirty="0" err="1">
+                <a:latin typeface="Courier New" charset="0"/>
+                <a:ea typeface="Courier New" charset="0"/>
+                <a:cs typeface="Courier New" charset="0"/>
+              </a:rPr>
+              <a:t>icmp_seq</a:t>
+            </a:r>
+            <a:r>
+              <a:rPr lang="en-US" sz="1200" dirty="0">
+                <a:latin typeface="Courier New" charset="0"/>
+                <a:ea typeface="Courier New" charset="0"/>
+                <a:cs typeface="Courier New" charset="0"/>
+              </a:rPr>
+              <a:t>=3 </a:t>
+            </a:r>
+            <a:r>
+              <a:rPr lang="en-US" sz="1200" dirty="0" err="1">
+                <a:latin typeface="Courier New" charset="0"/>
+                <a:ea typeface="Courier New" charset="0"/>
+                <a:cs typeface="Courier New" charset="0"/>
+              </a:rPr>
+              <a:t>ttl</a:t>
+            </a:r>
+            <a:r>
+              <a:rPr lang="en-US" sz="1200" dirty="0">
+                <a:latin typeface="Courier New" charset="0"/>
+                <a:ea typeface="Courier New" charset="0"/>
+                <a:cs typeface="Courier New" charset="0"/>
+              </a:rPr>
+              <a:t>=54 time=35.267 </a:t>
+            </a:r>
+            <a:r>
+              <a:rPr lang="en-US" sz="1200" dirty="0" err="1" smtClean="0">
+                <a:latin typeface="Courier New" charset="0"/>
+                <a:ea typeface="Courier New" charset="0"/>
+                <a:cs typeface="Courier New" charset="0"/>
+              </a:rPr>
+              <a:t>ms</a:t>
+            </a:r>
+            <a:endParaRPr lang="en-US" sz="1200" dirty="0" smtClean="0">
+              <a:latin typeface="Courier New" charset="0"/>
+              <a:ea typeface="Courier New" charset="0"/>
+              <a:cs typeface="Courier New" charset="0"/>
+            </a:endParaRPr>
+          </a:p>
+          <a:p>
+            <a:r>
+              <a:rPr lang="en-US" sz="1200" dirty="0" smtClean="0">
+                <a:latin typeface="Courier New" charset="0"/>
+                <a:ea typeface="Courier New" charset="0"/>
+                <a:cs typeface="Courier New" charset="0"/>
+              </a:rPr>
+              <a:t>64 </a:t>
+            </a:r>
+            <a:r>
+              <a:rPr lang="en-US" sz="1200" dirty="0">
+                <a:latin typeface="Courier New" charset="0"/>
+                <a:ea typeface="Courier New" charset="0"/>
+                <a:cs typeface="Courier New" charset="0"/>
+              </a:rPr>
+              <a:t>bytes from 98.138.253.109: </a:t>
+            </a:r>
+            <a:r>
+              <a:rPr lang="en-US" sz="1200" dirty="0" err="1">
+                <a:latin typeface="Courier New" charset="0"/>
+                <a:ea typeface="Courier New" charset="0"/>
+                <a:cs typeface="Courier New" charset="0"/>
+              </a:rPr>
+              <a:t>icmp_seq</a:t>
+            </a:r>
+            <a:r>
+              <a:rPr lang="en-US" sz="1200" dirty="0">
+                <a:latin typeface="Courier New" charset="0"/>
+                <a:ea typeface="Courier New" charset="0"/>
+                <a:cs typeface="Courier New" charset="0"/>
+              </a:rPr>
+              <a:t>=4 </a:t>
+            </a:r>
+            <a:r>
+              <a:rPr lang="en-US" sz="1200" dirty="0" err="1">
+                <a:latin typeface="Courier New" charset="0"/>
+                <a:ea typeface="Courier New" charset="0"/>
+                <a:cs typeface="Courier New" charset="0"/>
+              </a:rPr>
+              <a:t>ttl</a:t>
+            </a:r>
+            <a:r>
+              <a:rPr lang="en-US" sz="1200" dirty="0">
+                <a:latin typeface="Courier New" charset="0"/>
+                <a:ea typeface="Courier New" charset="0"/>
+                <a:cs typeface="Courier New" charset="0"/>
+              </a:rPr>
+              <a:t>=54 time=38.442 </a:t>
+            </a:r>
+            <a:r>
+              <a:rPr lang="en-US" sz="1200" dirty="0" err="1" smtClean="0">
+                <a:latin typeface="Courier New" charset="0"/>
+                <a:ea typeface="Courier New" charset="0"/>
+                <a:cs typeface="Courier New" charset="0"/>
+              </a:rPr>
+              <a:t>ms</a:t>
+            </a:r>
+            <a:endParaRPr lang="en-US" sz="1200" dirty="0" smtClean="0">
+              <a:latin typeface="Courier New" charset="0"/>
+              <a:ea typeface="Courier New" charset="0"/>
+              <a:cs typeface="Courier New" charset="0"/>
+            </a:endParaRPr>
+          </a:p>
+          <a:p>
+            <a:r>
+              <a:rPr lang="en-US" sz="1200" dirty="0" smtClean="0">
+                <a:latin typeface="Courier New" charset="0"/>
+                <a:ea typeface="Courier New" charset="0"/>
+                <a:cs typeface="Courier New" charset="0"/>
+              </a:rPr>
+              <a:t>^</a:t>
+            </a:r>
+            <a:r>
+              <a:rPr lang="en-US" sz="1200" dirty="0">
+                <a:latin typeface="Courier New" charset="0"/>
+                <a:ea typeface="Courier New" charset="0"/>
+                <a:cs typeface="Courier New" charset="0"/>
+              </a:rPr>
+              <a:t>C--- </a:t>
+            </a:r>
+            <a:r>
+              <a:rPr lang="en-US" sz="1200" dirty="0" err="1">
+                <a:latin typeface="Courier New" charset="0"/>
+                <a:ea typeface="Courier New" charset="0"/>
+                <a:cs typeface="Courier New" charset="0"/>
+              </a:rPr>
+              <a:t>yahoo.com</a:t>
+            </a:r>
+            <a:r>
+              <a:rPr lang="en-US" sz="1200" dirty="0">
+                <a:latin typeface="Courier New" charset="0"/>
+                <a:ea typeface="Courier New" charset="0"/>
+                <a:cs typeface="Courier New" charset="0"/>
+              </a:rPr>
+              <a:t> ping statistics ---5 packets transmitted, 5 packets received, 0.0% packet </a:t>
+            </a:r>
+            <a:r>
+              <a:rPr lang="en-US" sz="1200" dirty="0" err="1">
+                <a:latin typeface="Courier New" charset="0"/>
+                <a:ea typeface="Courier New" charset="0"/>
+                <a:cs typeface="Courier New" charset="0"/>
+              </a:rPr>
+              <a:t>lossround</a:t>
+            </a:r>
+            <a:r>
+              <a:rPr lang="en-US" sz="1200" dirty="0">
+                <a:latin typeface="Courier New" charset="0"/>
+                <a:ea typeface="Courier New" charset="0"/>
+                <a:cs typeface="Courier New" charset="0"/>
+              </a:rPr>
+              <a:t>-trip min/</a:t>
+            </a:r>
+            <a:r>
+              <a:rPr lang="en-US" sz="1200" dirty="0" err="1">
+                <a:latin typeface="Courier New" charset="0"/>
+                <a:ea typeface="Courier New" charset="0"/>
+                <a:cs typeface="Courier New" charset="0"/>
+              </a:rPr>
+              <a:t>avg</a:t>
+            </a:r>
+            <a:r>
+              <a:rPr lang="en-US" sz="1200" dirty="0">
+                <a:latin typeface="Courier New" charset="0"/>
+                <a:ea typeface="Courier New" charset="0"/>
+                <a:cs typeface="Courier New" charset="0"/>
+              </a:rPr>
+              <a:t>/max/</a:t>
+            </a:r>
+            <a:r>
+              <a:rPr lang="en-US" sz="1200" dirty="0" err="1">
+                <a:latin typeface="Courier New" charset="0"/>
+                <a:ea typeface="Courier New" charset="0"/>
+                <a:cs typeface="Courier New" charset="0"/>
+              </a:rPr>
+              <a:t>stddev</a:t>
+            </a:r>
+            <a:r>
+              <a:rPr lang="en-US" sz="1200" dirty="0">
+                <a:latin typeface="Courier New" charset="0"/>
+                <a:ea typeface="Courier New" charset="0"/>
+                <a:cs typeface="Courier New" charset="0"/>
+              </a:rPr>
+              <a:t> = 33.469/34.878/38.442/1.902 </a:t>
+            </a:r>
+            <a:r>
+              <a:rPr lang="en-US" sz="1200" dirty="0" err="1">
+                <a:latin typeface="Courier New" charset="0"/>
+                <a:ea typeface="Courier New" charset="0"/>
+                <a:cs typeface="Courier New" charset="0"/>
+              </a:rPr>
+              <a:t>ms</a:t>
+            </a:r>
+            <a:endParaRPr lang="en-US" sz="1200" dirty="0">
+              <a:latin typeface="Courier New" charset="0"/>
+              <a:ea typeface="Courier New" charset="0"/>
+              <a:cs typeface="Courier New" charset="0"/>
+            </a:endParaRPr>
+          </a:p>
+        </p:txBody>
+      </p:sp>
+      <p:sp>
+        <p:nvSpPr>
+          <p:cNvPr id="3" name="Content Placeholder 2"/>
+          <p:cNvSpPr>
+            <a:spLocks noGrp="1"/>
+          </p:cNvSpPr>
+          <p:nvPr>
+            <p:ph type="body" sz="half" idx="2"/>
+          </p:nvPr>
+        </p:nvSpPr>
+        <p:spPr/>
+        <p:txBody>
+          <a:bodyPr>
+            <a:normAutofit/>
+          </a:bodyPr>
+          <a:lstStyle/>
+          <a:p>
+            <a:r>
+              <a:rPr lang="en-US" dirty="0" smtClean="0"/>
+              <a:t>Least known or understood</a:t>
+            </a:r>
+          </a:p>
+          <a:p>
+            <a:r>
+              <a:rPr lang="en-US" dirty="0" smtClean="0"/>
+              <a:t>Change in latency over time</a:t>
+            </a:r>
+          </a:p>
+          <a:p>
+            <a:endParaRPr lang="en-US" dirty="0" smtClean="0"/>
+          </a:p>
+        </p:txBody>
+      </p:sp>
+      <p:sp>
+        <p:nvSpPr>
+          <p:cNvPr id="4" name="Footer Placeholder 3"/>
+          <p:cNvSpPr>
+            <a:spLocks noGrp="1"/>
+          </p:cNvSpPr>
+          <p:nvPr>
+            <p:ph type="ftr" sz="quarter" idx="11"/>
+          </p:nvPr>
+        </p:nvSpPr>
+        <p:spPr/>
+        <p:txBody>
+          <a:bodyPr/>
+          <a:lstStyle/>
+          <a:p>
+            <a:r>
+              <a:rPr lang="en-US" smtClean="0"/>
+              <a:t>Introduction to Operating Systems</a:t>
+            </a:r>
+            <a:endParaRPr lang="en-US" dirty="0"/>
+          </a:p>
+        </p:txBody>
+      </p:sp>
+    </p:spTree>
+    <p:extLst>
+      <p:ext uri="{BB962C8B-B14F-4D97-AF65-F5344CB8AC3E}">
+        <p14:creationId xmlns:p14="http://schemas.microsoft.com/office/powerpoint/2010/main" val="1701143928"/>
+      </p:ext>
+    </p:extLst>
+  </p:cSld>
+  <p:clrMapOvr>
+    <a:masterClrMapping/>
+  </p:clrMapOvr>
+  <p:timing>
+    <p:tnLst>
+      <p:par>
+        <p:cTn id="1" dur="indefinite" restart="never" nodeType="tmRoot"/>
+      </p:par>
+    </p:tnLst>
+  </p:timing>
+</p:sld>
+</file>
+
+<file path=ppt/slides/slide22.xml><?xml version="1.0" encoding="utf-8"?>
+<p:sld xmlns:a="http://schemas.openxmlformats.org/drawingml/2006/main" xmlns:r="http://schemas.openxmlformats.org/officeDocument/2006/relationships" xmlns:p="http://schemas.openxmlformats.org/presentationml/2006/main">
+  <p:cSld>
+    <p:spTree>
+      <p:nvGrpSpPr>
+        <p:cNvPr id="1" name=""/>
+        <p:cNvGrpSpPr/>
+        <p:nvPr/>
+      </p:nvGrpSpPr>
+      <p:grpSpPr>
+        <a:xfrm>
+          <a:off x="0" y="0"/>
+          <a:ext cx="0" cy="0"/>
+          <a:chOff x="0" y="0"/>
+          <a:chExt cx="0" cy="0"/>
+        </a:xfrm>
+      </p:grpSpPr>
+      <p:sp>
+        <p:nvSpPr>
+          <p:cNvPr id="6" name="Title 5"/>
+          <p:cNvSpPr>
+            <a:spLocks noGrp="1"/>
+          </p:cNvSpPr>
+          <p:nvPr>
+            <p:ph type="title"/>
+          </p:nvPr>
+        </p:nvSpPr>
+        <p:spPr/>
+        <p:txBody>
+          <a:bodyPr/>
+          <a:lstStyle/>
+          <a:p>
+            <a:r>
+              <a:rPr lang="en-US" dirty="0" smtClean="0"/>
+              <a:t>Who cares about jitter?</a:t>
+            </a:r>
+            <a:endParaRPr lang="en-US" dirty="0"/>
+          </a:p>
+        </p:txBody>
+      </p:sp>
+      <p:sp>
+        <p:nvSpPr>
+          <p:cNvPr id="7" name="Content Placeholder 6"/>
+          <p:cNvSpPr>
+            <a:spLocks noGrp="1"/>
+          </p:cNvSpPr>
+          <p:nvPr>
+            <p:ph idx="1"/>
+          </p:nvPr>
+        </p:nvSpPr>
+        <p:spPr/>
+        <p:txBody>
+          <a:bodyPr/>
+          <a:lstStyle/>
+          <a:p>
+            <a:r>
+              <a:rPr lang="en-US" dirty="0" smtClean="0"/>
+              <a:t>Network time protocols such as NTP and PTP</a:t>
+            </a:r>
+          </a:p>
+          <a:p>
+            <a:r>
+              <a:rPr lang="en-US" dirty="0" smtClean="0"/>
+              <a:t>Real-Time Operating Systems</a:t>
+            </a:r>
+          </a:p>
+          <a:p>
+            <a:pPr lvl="1"/>
+            <a:r>
+              <a:rPr lang="en-US" dirty="0" smtClean="0"/>
+              <a:t>Flight safety</a:t>
+            </a:r>
+          </a:p>
+          <a:p>
+            <a:pPr lvl="1"/>
+            <a:r>
+              <a:rPr lang="en-US" dirty="0" smtClean="0"/>
+              <a:t>Robotics</a:t>
+            </a:r>
+          </a:p>
+          <a:p>
+            <a:pPr lvl="1"/>
+            <a:r>
+              <a:rPr lang="en-US" dirty="0" smtClean="0"/>
+              <a:t>Things that move in the real world</a:t>
+            </a:r>
+          </a:p>
+          <a:p>
+            <a:r>
+              <a:rPr lang="en-US" dirty="0" smtClean="0"/>
+              <a:t>High fidelity data recording</a:t>
+            </a:r>
+          </a:p>
+          <a:p>
+            <a:pPr lvl="1"/>
+            <a:r>
+              <a:rPr lang="en-US" dirty="0" smtClean="0"/>
+              <a:t>Climate</a:t>
+            </a:r>
+          </a:p>
+          <a:p>
+            <a:pPr lvl="1"/>
+            <a:r>
+              <a:rPr lang="en-US" dirty="0" smtClean="0"/>
+              <a:t>Oceanography</a:t>
+            </a:r>
+          </a:p>
+          <a:p>
+            <a:r>
+              <a:rPr lang="en-US" dirty="0" smtClean="0"/>
+              <a:t>Audio Systems</a:t>
+            </a:r>
+          </a:p>
+          <a:p>
+            <a:r>
+              <a:rPr lang="en-US" dirty="0" err="1" smtClean="0"/>
+              <a:t>Lipsynch</a:t>
+            </a:r>
+            <a:endParaRPr lang="en-US" dirty="0"/>
+          </a:p>
+        </p:txBody>
+      </p:sp>
+      <p:sp>
+        <p:nvSpPr>
+          <p:cNvPr id="5" name="Footer Placeholder 4"/>
+          <p:cNvSpPr>
+            <a:spLocks noGrp="1"/>
+          </p:cNvSpPr>
+          <p:nvPr>
+            <p:ph type="ftr" sz="quarter" idx="11"/>
+          </p:nvPr>
+        </p:nvSpPr>
+        <p:spPr/>
+        <p:txBody>
+          <a:bodyPr/>
+          <a:lstStyle/>
+          <a:p>
+            <a:r>
+              <a:rPr lang="en-US" smtClean="0"/>
+              <a:t>Introduction to Operating Systems</a:t>
+            </a:r>
+            <a:endParaRPr lang="en-US"/>
+          </a:p>
+        </p:txBody>
+      </p:sp>
+    </p:spTree>
+    <p:extLst>
+      <p:ext uri="{BB962C8B-B14F-4D97-AF65-F5344CB8AC3E}">
+        <p14:creationId xmlns:p14="http://schemas.microsoft.com/office/powerpoint/2010/main" val="1279974992"/>
+      </p:ext>
+    </p:extLst>
+  </p:cSld>
+  <p:clrMapOvr>
+    <a:masterClrMapping/>
+  </p:clrMapOvr>
+</p:sld>
+</file>
+
+<file path=ppt/slides/slide23.xml><?xml version="1.0" encoding="utf-8"?>
+<p:sld xmlns:a="http://schemas.openxmlformats.org/drawingml/2006/main" xmlns:r="http://schemas.openxmlformats.org/officeDocument/2006/relationships" xmlns:p="http://schemas.openxmlformats.org/presentationml/2006/main">
+  <p:cSld>
+    <p:spTree>
+      <p:nvGrpSpPr>
+        <p:cNvPr id="1" name=""/>
+        <p:cNvGrpSpPr/>
+        <p:nvPr/>
+      </p:nvGrpSpPr>
+      <p:grpSpPr>
+        <a:xfrm>
+          <a:off x="0" y="0"/>
+          <a:ext cx="0" cy="0"/>
+          <a:chOff x="0" y="0"/>
+          <a:chExt cx="0" cy="0"/>
+        </a:xfrm>
+      </p:grpSpPr>
+      <p:sp>
+        <p:nvSpPr>
+          <p:cNvPr id="2" name="Title 1"/>
+          <p:cNvSpPr>
+            <a:spLocks noGrp="1"/>
+          </p:cNvSpPr>
+          <p:nvPr>
+            <p:ph type="title"/>
+          </p:nvPr>
+        </p:nvSpPr>
+        <p:spPr/>
+        <p:txBody>
+          <a:bodyPr/>
+          <a:lstStyle/>
+          <a:p>
+            <a:r>
+              <a:rPr lang="en-US" dirty="0" smtClean="0"/>
+              <a:t>Judging the Code</a:t>
+            </a:r>
+            <a:endParaRPr lang="en-US" dirty="0"/>
+          </a:p>
+        </p:txBody>
+      </p:sp>
+      <p:sp>
+        <p:nvSpPr>
+          <p:cNvPr id="3" name="Content Placeholder 2"/>
+          <p:cNvSpPr>
+            <a:spLocks noGrp="1"/>
+          </p:cNvSpPr>
+          <p:nvPr>
+            <p:ph idx="1"/>
+          </p:nvPr>
+        </p:nvSpPr>
+        <p:spPr/>
+        <p:txBody>
+          <a:bodyPr/>
+          <a:lstStyle/>
+          <a:p>
+            <a:r>
+              <a:rPr lang="en-US" dirty="0" smtClean="0"/>
+              <a:t>Complexity</a:t>
+            </a:r>
+          </a:p>
+          <a:p>
+            <a:r>
+              <a:rPr lang="en-US" dirty="0" smtClean="0"/>
+              <a:t>Composability</a:t>
+            </a:r>
+          </a:p>
+          <a:p>
+            <a:r>
+              <a:rPr lang="en-US" dirty="0" err="1" smtClean="0"/>
+              <a:t>Tracatability</a:t>
+            </a:r>
+            <a:endParaRPr lang="en-US" dirty="0" smtClean="0"/>
+          </a:p>
+        </p:txBody>
+      </p:sp>
+      <p:sp>
+        <p:nvSpPr>
+          <p:cNvPr id="4" name="Footer Placeholder 3"/>
+          <p:cNvSpPr>
+            <a:spLocks noGrp="1"/>
+          </p:cNvSpPr>
+          <p:nvPr>
+            <p:ph type="ftr" sz="quarter" idx="11"/>
+          </p:nvPr>
+        </p:nvSpPr>
+        <p:spPr/>
+        <p:txBody>
+          <a:bodyPr/>
+          <a:lstStyle/>
+          <a:p>
+            <a:r>
+              <a:rPr lang="en-US" smtClean="0"/>
+              <a:t>Introduction to Operating Systems</a:t>
+            </a:r>
+            <a:endParaRPr lang="en-US" dirty="0"/>
+          </a:p>
+        </p:txBody>
+      </p:sp>
+    </p:spTree>
+    <p:extLst>
+      <p:ext uri="{BB962C8B-B14F-4D97-AF65-F5344CB8AC3E}">
+        <p14:creationId xmlns:p14="http://schemas.microsoft.com/office/powerpoint/2010/main" val="2058892444"/>
+      </p:ext>
+    </p:extLst>
+  </p:cSld>
+  <p:clrMapOvr>
+    <a:masterClrMapping/>
+  </p:clrMapOvr>
+  <p:timing>
+    <p:tnLst>
+      <p:par>
+        <p:cTn id="1" dur="indefinite" restart="never" nodeType="tmRoot"/>
+      </p:par>
+    </p:tnLst>
+  </p:timing>
+</p:sld>
+</file>
+
+<file path=ppt/slides/slide24.xml><?xml version="1.0" encoding="utf-8"?>
+<p:sld xmlns:a="http://schemas.openxmlformats.org/drawingml/2006/main" xmlns:r="http://schemas.openxmlformats.org/officeDocument/2006/relationships" xmlns:p="http://schemas.openxmlformats.org/presentationml/2006/main">
+  <p:cSld>
+    <p:spTree>
+      <p:nvGrpSpPr>
+        <p:cNvPr id="1" name=""/>
+        <p:cNvGrpSpPr/>
+        <p:nvPr/>
+      </p:nvGrpSpPr>
+      <p:grpSpPr>
+        <a:xfrm>
+          <a:off x="0" y="0"/>
+          <a:ext cx="0" cy="0"/>
+          <a:chOff x="0" y="0"/>
+          <a:chExt cx="0" cy="0"/>
+        </a:xfrm>
+      </p:grpSpPr>
+      <p:sp>
+        <p:nvSpPr>
+          <p:cNvPr id="2" name="Title 1"/>
+          <p:cNvSpPr>
+            <a:spLocks noGrp="1"/>
+          </p:cNvSpPr>
+          <p:nvPr>
+            <p:ph type="title"/>
+          </p:nvPr>
+        </p:nvSpPr>
+        <p:spPr/>
+        <p:txBody>
+          <a:bodyPr/>
+          <a:lstStyle/>
+          <a:p>
+            <a:r>
+              <a:rPr lang="en-US" dirty="0" smtClean="0"/>
+              <a:t>Complexity</a:t>
+            </a:r>
+            <a:endParaRPr lang="en-US" dirty="0"/>
+          </a:p>
+        </p:txBody>
+      </p:sp>
+      <p:sp>
+        <p:nvSpPr>
+          <p:cNvPr id="3" name="Content Placeholder 2"/>
+          <p:cNvSpPr>
+            <a:spLocks noGrp="1"/>
+          </p:cNvSpPr>
+          <p:nvPr>
+            <p:ph idx="1"/>
+          </p:nvPr>
+        </p:nvSpPr>
+        <p:spPr/>
+        <p:txBody>
+          <a:bodyPr/>
+          <a:lstStyle/>
+          <a:p>
+            <a:endParaRPr lang="en-US"/>
+          </a:p>
+        </p:txBody>
+      </p:sp>
+      <p:sp>
+        <p:nvSpPr>
+          <p:cNvPr id="4" name="Footer Placeholder 3"/>
+          <p:cNvSpPr>
+            <a:spLocks noGrp="1"/>
+          </p:cNvSpPr>
+          <p:nvPr>
+            <p:ph type="ftr" sz="quarter" idx="11"/>
+          </p:nvPr>
+        </p:nvSpPr>
+        <p:spPr/>
+        <p:txBody>
+          <a:bodyPr/>
+          <a:lstStyle/>
+          <a:p>
+            <a:r>
+              <a:rPr lang="en-US" smtClean="0"/>
+              <a:t>Introduction to Operating Systems</a:t>
+            </a:r>
+            <a:endParaRPr lang="en-US" dirty="0"/>
+          </a:p>
+        </p:txBody>
+      </p:sp>
+    </p:spTree>
+    <p:extLst>
+      <p:ext uri="{BB962C8B-B14F-4D97-AF65-F5344CB8AC3E}">
+        <p14:creationId xmlns:p14="http://schemas.microsoft.com/office/powerpoint/2010/main" val="1424878250"/>
+      </p:ext>
+    </p:extLst>
+  </p:cSld>
+  <p:clrMapOvr>
+    <a:masterClrMapping/>
+  </p:clrMapOvr>
+</p:sld>
+</file>
+
+<file path=ppt/slides/slide25.xml><?xml version="1.0" encoding="utf-8"?>
+<p:sld xmlns:a="http://schemas.openxmlformats.org/drawingml/2006/main" xmlns:r="http://schemas.openxmlformats.org/officeDocument/2006/relationships" xmlns:p="http://schemas.openxmlformats.org/presentationml/2006/main">
+  <p:cSld>
+    <p:spTree>
+      <p:nvGrpSpPr>
+        <p:cNvPr id="1" name=""/>
+        <p:cNvGrpSpPr/>
+        <p:nvPr/>
+      </p:nvGrpSpPr>
+      <p:grpSpPr>
+        <a:xfrm>
+          <a:off x="0" y="0"/>
+          <a:ext cx="0" cy="0"/>
+          <a:chOff x="0" y="0"/>
+          <a:chExt cx="0" cy="0"/>
+        </a:xfrm>
+      </p:grpSpPr>
+      <p:sp>
+        <p:nvSpPr>
+          <p:cNvPr id="2" name="Title 1"/>
+          <p:cNvSpPr>
+            <a:spLocks noGrp="1"/>
+          </p:cNvSpPr>
+          <p:nvPr>
+            <p:ph type="title"/>
+          </p:nvPr>
+        </p:nvSpPr>
+        <p:spPr/>
+        <p:txBody>
+          <a:bodyPr/>
+          <a:lstStyle/>
+          <a:p>
+            <a:r>
+              <a:rPr lang="en-US" dirty="0" smtClean="0"/>
+              <a:t>Composability</a:t>
+            </a:r>
+            <a:endParaRPr lang="en-US" dirty="0"/>
+          </a:p>
+        </p:txBody>
+      </p:sp>
+      <p:sp>
+        <p:nvSpPr>
+          <p:cNvPr id="3" name="Content Placeholder 2"/>
+          <p:cNvSpPr>
+            <a:spLocks noGrp="1"/>
+          </p:cNvSpPr>
+          <p:nvPr>
+            <p:ph idx="1"/>
+          </p:nvPr>
+        </p:nvSpPr>
+        <p:spPr/>
+        <p:txBody>
+          <a:bodyPr/>
+          <a:lstStyle/>
+          <a:p>
+            <a:endParaRPr lang="en-US"/>
+          </a:p>
+        </p:txBody>
+      </p:sp>
+      <p:sp>
+        <p:nvSpPr>
+          <p:cNvPr id="4" name="Footer Placeholder 3"/>
+          <p:cNvSpPr>
+            <a:spLocks noGrp="1"/>
+          </p:cNvSpPr>
+          <p:nvPr>
+            <p:ph type="ftr" sz="quarter" idx="11"/>
+          </p:nvPr>
+        </p:nvSpPr>
+        <p:spPr/>
+        <p:txBody>
+          <a:bodyPr/>
+          <a:lstStyle/>
+          <a:p>
+            <a:r>
+              <a:rPr lang="en-US" smtClean="0"/>
+              <a:t>Introduction to Operating Systems</a:t>
+            </a:r>
+            <a:endParaRPr lang="en-US" dirty="0"/>
+          </a:p>
+        </p:txBody>
+      </p:sp>
+    </p:spTree>
+    <p:extLst>
+      <p:ext uri="{BB962C8B-B14F-4D97-AF65-F5344CB8AC3E}">
+        <p14:creationId xmlns:p14="http://schemas.microsoft.com/office/powerpoint/2010/main" val="96884457"/>
+      </p:ext>
+    </p:extLst>
+  </p:cSld>
+  <p:clrMapOvr>
+    <a:masterClrMapping/>
+  </p:clrMapOvr>
+</p:sld>
+</file>
+
+<file path=ppt/slides/slide26.xml><?xml version="1.0" encoding="utf-8"?>
+<p:sld xmlns:a="http://schemas.openxmlformats.org/drawingml/2006/main" xmlns:r="http://schemas.openxmlformats.org/officeDocument/2006/relationships" xmlns:p="http://schemas.openxmlformats.org/presentationml/2006/main">
+  <p:cSld>
+    <p:spTree>
+      <p:nvGrpSpPr>
+        <p:cNvPr id="1" name=""/>
+        <p:cNvGrpSpPr/>
+        <p:nvPr/>
+      </p:nvGrpSpPr>
+      <p:grpSpPr>
+        <a:xfrm>
+          <a:off x="0" y="0"/>
+          <a:ext cx="0" cy="0"/>
+          <a:chOff x="0" y="0"/>
+          <a:chExt cx="0" cy="0"/>
+        </a:xfrm>
+      </p:grpSpPr>
+      <p:sp>
+        <p:nvSpPr>
+          <p:cNvPr id="2" name="Title 1"/>
+          <p:cNvSpPr>
+            <a:spLocks noGrp="1"/>
+          </p:cNvSpPr>
+          <p:nvPr>
+            <p:ph type="title"/>
+          </p:nvPr>
+        </p:nvSpPr>
+        <p:spPr/>
+        <p:txBody>
+          <a:bodyPr/>
+          <a:lstStyle/>
+          <a:p>
+            <a:r>
+              <a:rPr lang="en-US" dirty="0" smtClean="0"/>
+              <a:t>Tractability</a:t>
+            </a:r>
+            <a:endParaRPr lang="en-US" dirty="0"/>
+          </a:p>
+        </p:txBody>
+      </p:sp>
+      <p:sp>
+        <p:nvSpPr>
+          <p:cNvPr id="3" name="Content Placeholder 2"/>
+          <p:cNvSpPr>
+            <a:spLocks noGrp="1"/>
+          </p:cNvSpPr>
+          <p:nvPr>
+            <p:ph idx="1"/>
+          </p:nvPr>
+        </p:nvSpPr>
+        <p:spPr/>
+        <p:txBody>
+          <a:bodyPr/>
+          <a:lstStyle/>
+          <a:p>
+            <a:endParaRPr lang="en-US"/>
+          </a:p>
+        </p:txBody>
+      </p:sp>
+      <p:sp>
+        <p:nvSpPr>
+          <p:cNvPr id="4" name="Footer Placeholder 3"/>
+          <p:cNvSpPr>
+            <a:spLocks noGrp="1"/>
+          </p:cNvSpPr>
+          <p:nvPr>
+            <p:ph type="ftr" sz="quarter" idx="11"/>
+          </p:nvPr>
+        </p:nvSpPr>
+        <p:spPr/>
+        <p:txBody>
+          <a:bodyPr/>
+          <a:lstStyle/>
+          <a:p>
+            <a:r>
+              <a:rPr lang="en-US" smtClean="0"/>
+              <a:t>Introduction to Operating Systems</a:t>
+            </a:r>
+            <a:endParaRPr lang="en-US" dirty="0"/>
+          </a:p>
+        </p:txBody>
+      </p:sp>
+    </p:spTree>
+    <p:extLst>
+      <p:ext uri="{BB962C8B-B14F-4D97-AF65-F5344CB8AC3E}">
+        <p14:creationId xmlns:p14="http://schemas.microsoft.com/office/powerpoint/2010/main" val="334571694"/>
+      </p:ext>
+    </p:extLst>
+  </p:cSld>
+  <p:clrMapOvr>
+    <a:masterClrMapping/>
+  </p:clrMapOvr>
+</p:sld>
+</file>
+
+<file path=ppt/slides/slide27.xml><?xml version="1.0" encoding="utf-8"?>
+<p:sld xmlns:a="http://schemas.openxmlformats.org/drawingml/2006/main" xmlns:r="http://schemas.openxmlformats.org/officeDocument/2006/relationships" xmlns:p="http://schemas.openxmlformats.org/presentationml/2006/main">
+  <p:cSld>
+    <p:spTree>
+      <p:nvGrpSpPr>
+        <p:cNvPr id="1" name=""/>
+        <p:cNvGrpSpPr/>
+        <p:nvPr/>
+      </p:nvGrpSpPr>
+      <p:grpSpPr>
+        <a:xfrm>
+          <a:off x="0" y="0"/>
+          <a:ext cx="0" cy="0"/>
+          <a:chOff x="0" y="0"/>
+          <a:chExt cx="0" cy="0"/>
+        </a:xfrm>
+      </p:grpSpPr>
+      <p:sp>
+        <p:nvSpPr>
+          <p:cNvPr id="2" name="Title 1"/>
+          <p:cNvSpPr>
+            <a:spLocks noGrp="1"/>
+          </p:cNvSpPr>
+          <p:nvPr>
+            <p:ph type="title"/>
+          </p:nvPr>
+        </p:nvSpPr>
+        <p:spPr/>
+        <p:txBody>
+          <a:bodyPr/>
+          <a:lstStyle/>
+          <a:p>
+            <a:r>
+              <a:rPr lang="en-US" dirty="0" smtClean="0"/>
               <a:t>FreeBSD</a:t>
             </a:r>
             <a:endParaRPr lang="en-US" dirty="0"/>
@@ -6452,7 +8605,7 @@
 </p:sld>
 </file>
 
-<file path=ppt/slides/slide17.xml><?xml version="1.0" encoding="utf-8"?>
+<file path=ppt/slides/slide28.xml><?xml version="1.0" encoding="utf-8"?>
 <p:sld xmlns:a="http://schemas.openxmlformats.org/drawingml/2006/main" xmlns:r="http://schemas.openxmlformats.org/officeDocument/2006/relationships" xmlns:p="http://schemas.openxmlformats.org/presentationml/2006/main">
   <p:cSld>
     <p:spTree>
@@ -6615,7 +8768,7 @@
 </p:sld>
 </file>
 
-<file path=ppt/slides/slide18.xml><?xml version="1.0" encoding="utf-8"?>
+<file path=ppt/slides/slide29.xml><?xml version="1.0" encoding="utf-8"?>
 <p:sld xmlns:a="http://schemas.openxmlformats.org/drawingml/2006/main" xmlns:r="http://schemas.openxmlformats.org/officeDocument/2006/relationships" xmlns:p="http://schemas.openxmlformats.org/presentationml/2006/main">
   <p:cSld>
     <p:spTree>
@@ -6744,7 +8897,256 @@
 </p:sld>
 </file>
 
-<file path=ppt/slides/slide19.xml><?xml version="1.0" encoding="utf-8"?>
+<file path=ppt/slides/slide3.xml><?xml version="1.0" encoding="utf-8"?>
+<p:sld xmlns:a="http://schemas.openxmlformats.org/drawingml/2006/main" xmlns:r="http://schemas.openxmlformats.org/officeDocument/2006/relationships" xmlns:p="http://schemas.openxmlformats.org/presentationml/2006/main">
+  <p:cSld>
+    <p:spTree>
+      <p:nvGrpSpPr>
+        <p:cNvPr id="1" name=""/>
+        <p:cNvGrpSpPr/>
+        <p:nvPr/>
+      </p:nvGrpSpPr>
+      <p:grpSpPr>
+        <a:xfrm>
+          <a:off x="0" y="0"/>
+          <a:ext cx="0" cy="0"/>
+          <a:chOff x="0" y="0"/>
+          <a:chExt cx="0" cy="0"/>
+        </a:xfrm>
+      </p:grpSpPr>
+      <p:sp>
+        <p:nvSpPr>
+          <p:cNvPr id="2" name="Title 1"/>
+          <p:cNvSpPr>
+            <a:spLocks noGrp="1"/>
+          </p:cNvSpPr>
+          <p:nvPr>
+            <p:ph type="title"/>
+          </p:nvPr>
+        </p:nvSpPr>
+        <p:spPr/>
+        <p:txBody>
+          <a:bodyPr/>
+          <a:lstStyle/>
+          <a:p>
+            <a:r>
+              <a:rPr lang="en-US" dirty="0" smtClean="0"/>
+              <a:t>Course Outline</a:t>
+            </a:r>
+            <a:endParaRPr lang="en-US" dirty="0"/>
+          </a:p>
+        </p:txBody>
+      </p:sp>
+      <p:sp>
+        <p:nvSpPr>
+          <p:cNvPr id="5" name="Text Placeholder 4"/>
+          <p:cNvSpPr>
+            <a:spLocks noGrp="1"/>
+          </p:cNvSpPr>
+          <p:nvPr>
+            <p:ph type="body" idx="1"/>
+          </p:nvPr>
+        </p:nvSpPr>
+        <p:spPr/>
+        <p:txBody>
+          <a:bodyPr/>
+          <a:lstStyle/>
+          <a:p>
+            <a:r>
+              <a:rPr lang="en-US" dirty="0" smtClean="0"/>
+              <a:t>Day 1</a:t>
+            </a:r>
+            <a:endParaRPr lang="en-US" dirty="0"/>
+          </a:p>
+        </p:txBody>
+      </p:sp>
+      <p:sp>
+        <p:nvSpPr>
+          <p:cNvPr id="6" name="Content Placeholder 5"/>
+          <p:cNvSpPr>
+            <a:spLocks noGrp="1"/>
+          </p:cNvSpPr>
+          <p:nvPr>
+            <p:ph sz="half" idx="2"/>
+          </p:nvPr>
+        </p:nvSpPr>
+        <p:spPr/>
+        <p:txBody>
+          <a:bodyPr/>
+          <a:lstStyle/>
+          <a:p>
+            <a:r>
+              <a:rPr lang="en-US" dirty="0" smtClean="0"/>
+              <a:t>High </a:t>
+            </a:r>
+            <a:r>
+              <a:rPr lang="en-US" dirty="0"/>
+              <a:t>Level Definitions</a:t>
+            </a:r>
+          </a:p>
+          <a:p>
+            <a:r>
+              <a:rPr lang="en-US" dirty="0" smtClean="0"/>
+              <a:t>History</a:t>
+            </a:r>
+            <a:endParaRPr lang="en-US" dirty="0"/>
+          </a:p>
+          <a:p>
+            <a:r>
+              <a:rPr lang="en-US" dirty="0" smtClean="0"/>
+              <a:t>Introduction </a:t>
+            </a:r>
+            <a:r>
+              <a:rPr lang="en-US" dirty="0"/>
+              <a:t>to Tracing</a:t>
+            </a:r>
+          </a:p>
+          <a:p>
+            <a:r>
+              <a:rPr lang="en-US" dirty="0" smtClean="0"/>
+              <a:t>Lab </a:t>
+            </a:r>
+            <a:r>
+              <a:rPr lang="en-US" dirty="0"/>
+              <a:t>1: System Setup and First Traces</a:t>
+            </a:r>
+          </a:p>
+          <a:p>
+            <a:endParaRPr lang="en-US" dirty="0"/>
+          </a:p>
+        </p:txBody>
+      </p:sp>
+      <p:sp>
+        <p:nvSpPr>
+          <p:cNvPr id="7" name="Text Placeholder 6"/>
+          <p:cNvSpPr>
+            <a:spLocks noGrp="1"/>
+          </p:cNvSpPr>
+          <p:nvPr>
+            <p:ph type="body" sz="quarter" idx="3"/>
+          </p:nvPr>
+        </p:nvSpPr>
+        <p:spPr/>
+        <p:txBody>
+          <a:bodyPr/>
+          <a:lstStyle/>
+          <a:p>
+            <a:r>
+              <a:rPr lang="en-US" dirty="0" smtClean="0"/>
+              <a:t>Day 2</a:t>
+            </a:r>
+            <a:endParaRPr lang="en-US" dirty="0"/>
+          </a:p>
+        </p:txBody>
+      </p:sp>
+      <p:sp>
+        <p:nvSpPr>
+          <p:cNvPr id="8" name="Content Placeholder 7"/>
+          <p:cNvSpPr>
+            <a:spLocks noGrp="1"/>
+          </p:cNvSpPr>
+          <p:nvPr>
+            <p:ph sz="quarter" idx="4"/>
+          </p:nvPr>
+        </p:nvSpPr>
+        <p:spPr/>
+        <p:txBody>
+          <a:bodyPr/>
+          <a:lstStyle/>
+          <a:p>
+            <a:r>
+              <a:rPr lang="en-US" dirty="0" smtClean="0"/>
+              <a:t>Quiz</a:t>
+            </a:r>
+            <a:endParaRPr lang="en-US" dirty="0"/>
+          </a:p>
+          <a:p>
+            <a:r>
+              <a:rPr lang="en-US" dirty="0" smtClean="0"/>
+              <a:t>Processes</a:t>
+            </a:r>
+            <a:endParaRPr lang="en-US" dirty="0"/>
+          </a:p>
+          <a:p>
+            <a:r>
+              <a:rPr lang="en-US" dirty="0" smtClean="0"/>
+              <a:t>Locking</a:t>
+            </a:r>
+            <a:endParaRPr lang="en-US" dirty="0"/>
+          </a:p>
+          <a:p>
+            <a:r>
+              <a:rPr lang="en-US" dirty="0" smtClean="0"/>
+              <a:t>Scheduling</a:t>
+            </a:r>
+            <a:endParaRPr lang="en-US" dirty="0"/>
+          </a:p>
+          <a:p>
+            <a:r>
+              <a:rPr lang="en-US" dirty="0" smtClean="0"/>
+              <a:t>Virtual </a:t>
+            </a:r>
+            <a:r>
+              <a:rPr lang="en-US" dirty="0"/>
+              <a:t>Memory</a:t>
+            </a:r>
+          </a:p>
+          <a:p>
+            <a:r>
+              <a:rPr lang="en-US" dirty="0" smtClean="0"/>
+              <a:t>Lab </a:t>
+            </a:r>
+            <a:r>
+              <a:rPr lang="en-US" dirty="0"/>
+              <a:t>2: Tracking Processes</a:t>
+            </a:r>
+          </a:p>
+        </p:txBody>
+      </p:sp>
+      <p:sp>
+        <p:nvSpPr>
+          <p:cNvPr id="4" name="Footer Placeholder 3"/>
+          <p:cNvSpPr>
+            <a:spLocks noGrp="1"/>
+          </p:cNvSpPr>
+          <p:nvPr>
+            <p:ph type="ftr" sz="quarter" idx="11"/>
+          </p:nvPr>
+        </p:nvSpPr>
+        <p:spPr/>
+        <p:txBody>
+          <a:bodyPr/>
+          <a:lstStyle/>
+          <a:p>
+            <a:r>
+              <a:rPr lang="en-US" smtClean="0"/>
+              <a:t>Introduction to Operating Systems</a:t>
+            </a:r>
+            <a:endParaRPr lang="en-US" dirty="0"/>
+          </a:p>
+        </p:txBody>
+      </p:sp>
+    </p:spTree>
+    <p:extLst>
+      <p:ext uri="{BB962C8B-B14F-4D97-AF65-F5344CB8AC3E}">
+        <p14:creationId xmlns:p14="http://schemas.microsoft.com/office/powerpoint/2010/main" val="1691063372"/>
+      </p:ext>
+    </p:extLst>
+  </p:cSld>
+  <p:clrMapOvr>
+    <a:masterClrMapping/>
+  </p:clrMapOvr>
+  <p:timing>
+    <p:tnLst>
+      <p:par>
+        <p:cTn id="1" dur="indefinite" restart="never" nodeType="tmRoot"/>
+      </p:par>
+    </p:tnLst>
+  </p:timing>
+</p:sld>
+</file>
+
+<file path=ppt/slides/slide30.xml><?xml version="1.0" encoding="utf-8"?>
 <p:sld xmlns:a="http://schemas.openxmlformats.org/drawingml/2006/main" xmlns:r="http://schemas.openxmlformats.org/officeDocument/2006/relationships" xmlns:p="http://schemas.openxmlformats.org/presentationml/2006/main">
   <p:cSld>
     <p:spTree>
@@ -6857,136 +9259,7 @@
 </p:sld>
 </file>
 
-<file path=ppt/slides/slide2.xml><?xml version="1.0" encoding="utf-8"?>
-<p:sld xmlns:a="http://schemas.openxmlformats.org/drawingml/2006/main" xmlns:r="http://schemas.openxmlformats.org/officeDocument/2006/relationships" xmlns:p="http://schemas.openxmlformats.org/presentationml/2006/main">
-  <p:cSld>
-    <p:spTree>
-      <p:nvGrpSpPr>
-        <p:cNvPr id="1" name=""/>
-        <p:cNvGrpSpPr/>
-        <p:nvPr/>
-      </p:nvGrpSpPr>
-      <p:grpSpPr>
-        <a:xfrm>
-          <a:off x="0" y="0"/>
-          <a:ext cx="0" cy="0"/>
-          <a:chOff x="0" y="0"/>
-          <a:chExt cx="0" cy="0"/>
-        </a:xfrm>
-      </p:grpSpPr>
-      <p:sp>
-        <p:nvSpPr>
-          <p:cNvPr id="2" name="Title 1"/>
-          <p:cNvSpPr>
-            <a:spLocks noGrp="1"/>
-          </p:cNvSpPr>
-          <p:nvPr>
-            <p:ph type="title"/>
-          </p:nvPr>
-        </p:nvSpPr>
-        <p:spPr/>
-        <p:txBody>
-          <a:bodyPr/>
-          <a:lstStyle/>
-          <a:p>
-            <a:r>
-              <a:rPr lang="en-US" dirty="0" smtClean="0"/>
-              <a:t>Objectives</a:t>
-            </a:r>
-            <a:endParaRPr lang="en-US" dirty="0"/>
-          </a:p>
-        </p:txBody>
-      </p:sp>
-      <p:sp>
-        <p:nvSpPr>
-          <p:cNvPr id="3" name="Content Placeholder 2"/>
-          <p:cNvSpPr>
-            <a:spLocks noGrp="1"/>
-          </p:cNvSpPr>
-          <p:nvPr>
-            <p:ph idx="1"/>
-          </p:nvPr>
-        </p:nvSpPr>
-        <p:spPr/>
-        <p:txBody>
-          <a:bodyPr/>
-          <a:lstStyle/>
-          <a:p>
-            <a:r>
-              <a:rPr lang="en-US" dirty="0" smtClean="0"/>
-              <a:t>A </a:t>
-            </a:r>
-            <a:r>
-              <a:rPr lang="en-US" dirty="0"/>
-              <a:t>grounding in systems principles</a:t>
-            </a:r>
-          </a:p>
-          <a:p>
-            <a:r>
-              <a:rPr lang="en-US" dirty="0" smtClean="0"/>
-              <a:t>A </a:t>
-            </a:r>
-            <a:r>
-              <a:rPr lang="en-US" dirty="0"/>
-              <a:t>grand tour of the Operating System</a:t>
-            </a:r>
-          </a:p>
-          <a:p>
-            <a:r>
-              <a:rPr lang="en-US" dirty="0" smtClean="0"/>
-              <a:t>Practical </a:t>
-            </a:r>
-            <a:r>
-              <a:rPr lang="en-US" dirty="0"/>
-              <a:t>insights into how the OS works</a:t>
-            </a:r>
-          </a:p>
-        </p:txBody>
-      </p:sp>
-      <p:sp>
-        <p:nvSpPr>
-          <p:cNvPr id="5" name="Footer Placeholder 4"/>
-          <p:cNvSpPr>
-            <a:spLocks noGrp="1"/>
-          </p:cNvSpPr>
-          <p:nvPr>
-            <p:ph type="ftr" sz="quarter" idx="11"/>
-          </p:nvPr>
-        </p:nvSpPr>
-        <p:spPr/>
-        <p:txBody>
-          <a:bodyPr/>
-          <a:lstStyle/>
-          <a:p>
-            <a:r>
-              <a:rPr lang="en-US" smtClean="0"/>
-              <a:t>Introduction to Operating Systems</a:t>
-            </a:r>
-            <a:endParaRPr lang="en-US" dirty="0"/>
-          </a:p>
-        </p:txBody>
-      </p:sp>
-    </p:spTree>
-    <p:extLst>
-      <p:ext uri="{BB962C8B-B14F-4D97-AF65-F5344CB8AC3E}">
-        <p14:creationId xmlns:p14="http://schemas.microsoft.com/office/powerpoint/2010/main" val="1886148566"/>
-      </p:ext>
-    </p:extLst>
-  </p:cSld>
-  <p:clrMapOvr>
-    <a:masterClrMapping/>
-  </p:clrMapOvr>
-  <p:timing>
-    <p:tnLst>
-      <p:par>
-        <p:cTn id="1" dur="indefinite" restart="never" nodeType="tmRoot"/>
-      </p:par>
-    </p:tnLst>
-  </p:timing>
-</p:sld>
-</file>
-
-<file path=ppt/slides/slide20.xml><?xml version="1.0" encoding="utf-8"?>
+<file path=ppt/slides/slide31.xml><?xml version="1.0" encoding="utf-8"?>
 <p:sld xmlns:a="http://schemas.openxmlformats.org/drawingml/2006/main" xmlns:r="http://schemas.openxmlformats.org/officeDocument/2006/relationships" xmlns:p="http://schemas.openxmlformats.org/presentationml/2006/main">
   <p:cSld>
     <p:spTree>
@@ -7136,7 +9409,7 @@
 </p:sld>
 </file>
 
-<file path=ppt/slides/slide21.xml><?xml version="1.0" encoding="utf-8"?>
+<file path=ppt/slides/slide32.xml><?xml version="1.0" encoding="utf-8"?>
 <p:sld xmlns:a="http://schemas.openxmlformats.org/drawingml/2006/main" xmlns:r="http://schemas.openxmlformats.org/officeDocument/2006/relationships" xmlns:p="http://schemas.openxmlformats.org/presentationml/2006/main">
   <p:cSld>
     <p:spTree>
@@ -7300,7 +9573,7 @@
 </p:sld>
 </file>
 
-<file path=ppt/slides/slide22.xml><?xml version="1.0" encoding="utf-8"?>
+<file path=ppt/slides/slide33.xml><?xml version="1.0" encoding="utf-8"?>
 <p:sld xmlns:a="http://schemas.openxmlformats.org/drawingml/2006/main" xmlns:r="http://schemas.openxmlformats.org/officeDocument/2006/relationships" xmlns:p="http://schemas.openxmlformats.org/presentationml/2006/main">
   <p:cSld>
     <p:spTree>
@@ -7413,7 +9686,7 @@
 </p:sld>
 </file>
 
-<file path=ppt/slides/slide23.xml><?xml version="1.0" encoding="utf-8"?>
+<file path=ppt/slides/slide34.xml><?xml version="1.0" encoding="utf-8"?>
 <p:sld xmlns:a="http://schemas.openxmlformats.org/drawingml/2006/main" xmlns:r="http://schemas.openxmlformats.org/officeDocument/2006/relationships" xmlns:p="http://schemas.openxmlformats.org/presentationml/2006/main">
   <p:cSld>
     <p:spTree>
@@ -7577,7 +9850,7 @@
 </p:sld>
 </file>
 
-<file path=ppt/slides/slide24.xml><?xml version="1.0" encoding="utf-8"?>
+<file path=ppt/slides/slide35.xml><?xml version="1.0" encoding="utf-8"?>
 <p:sld xmlns:a="http://schemas.openxmlformats.org/drawingml/2006/main" xmlns:r="http://schemas.openxmlformats.org/officeDocument/2006/relationships" xmlns:p="http://schemas.openxmlformats.org/presentationml/2006/main">
   <p:cSld>
     <p:spTree>
@@ -7832,7 +10105,7 @@
 </p:sld>
 </file>
 
-<file path=ppt/slides/slide25.xml><?xml version="1.0" encoding="utf-8"?>
+<file path=ppt/slides/slide36.xml><?xml version="1.0" encoding="utf-8"?>
 <p:sld xmlns:a="http://schemas.openxmlformats.org/drawingml/2006/main" xmlns:r="http://schemas.openxmlformats.org/officeDocument/2006/relationships" xmlns:p="http://schemas.openxmlformats.org/presentationml/2006/main">
   <p:cSld>
     <p:spTree>
@@ -7999,7 +10272,7 @@
 </p:sld>
 </file>
 
-<file path=ppt/slides/slide26.xml><?xml version="1.0" encoding="utf-8"?>
+<file path=ppt/slides/slide37.xml><?xml version="1.0" encoding="utf-8"?>
 <p:sld xmlns:a="http://schemas.openxmlformats.org/drawingml/2006/main" xmlns:r="http://schemas.openxmlformats.org/officeDocument/2006/relationships" xmlns:p="http://schemas.openxmlformats.org/presentationml/2006/main">
   <p:cSld>
     <p:spTree>
@@ -8112,7 +10385,7 @@
 </p:sld>
 </file>
 
-<file path=ppt/slides/slide27.xml><?xml version="1.0" encoding="utf-8"?>
+<file path=ppt/slides/slide38.xml><?xml version="1.0" encoding="utf-8"?>
 <p:sld xmlns:a="http://schemas.openxmlformats.org/drawingml/2006/main" xmlns:r="http://schemas.openxmlformats.org/officeDocument/2006/relationships" xmlns:p="http://schemas.openxmlformats.org/presentationml/2006/main">
   <p:cSld>
     <p:spTree>
@@ -8259,7 +10532,7 @@
 </p:sld>
 </file>
 
-<file path=ppt/slides/slide28.xml><?xml version="1.0" encoding="utf-8"?>
+<file path=ppt/slides/slide39.xml><?xml version="1.0" encoding="utf-8"?>
 <p:sld xmlns:a="http://schemas.openxmlformats.org/drawingml/2006/main" xmlns:r="http://schemas.openxmlformats.org/officeDocument/2006/relationships" xmlns:p="http://schemas.openxmlformats.org/presentationml/2006/main">
   <p:cSld>
     <p:spTree>
@@ -8372,7 +10645,259 @@
 </p:sld>
 </file>
 
-<file path=ppt/slides/slide29.xml><?xml version="1.0" encoding="utf-8"?>
+<file path=ppt/slides/slide4.xml><?xml version="1.0" encoding="utf-8"?>
+<p:sld xmlns:a="http://schemas.openxmlformats.org/drawingml/2006/main" xmlns:r="http://schemas.openxmlformats.org/officeDocument/2006/relationships" xmlns:p="http://schemas.openxmlformats.org/presentationml/2006/main">
+  <p:cSld>
+    <p:spTree>
+      <p:nvGrpSpPr>
+        <p:cNvPr id="1" name=""/>
+        <p:cNvGrpSpPr/>
+        <p:nvPr/>
+      </p:nvGrpSpPr>
+      <p:grpSpPr>
+        <a:xfrm>
+          <a:off x="0" y="0"/>
+          <a:ext cx="0" cy="0"/>
+          <a:chOff x="0" y="0"/>
+          <a:chExt cx="0" cy="0"/>
+        </a:xfrm>
+      </p:grpSpPr>
+      <p:sp>
+        <p:nvSpPr>
+          <p:cNvPr id="2" name="Title 1"/>
+          <p:cNvSpPr>
+            <a:spLocks noGrp="1"/>
+          </p:cNvSpPr>
+          <p:nvPr>
+            <p:ph type="title"/>
+          </p:nvPr>
+        </p:nvSpPr>
+        <p:spPr/>
+        <p:txBody>
+          <a:bodyPr/>
+          <a:lstStyle/>
+          <a:p>
+            <a:r>
+              <a:rPr lang="en-US" dirty="0" smtClean="0"/>
+              <a:t>Course Outline</a:t>
+            </a:r>
+            <a:endParaRPr lang="en-US" dirty="0"/>
+          </a:p>
+        </p:txBody>
+      </p:sp>
+      <p:sp>
+        <p:nvSpPr>
+          <p:cNvPr id="3" name="Text Placeholder 2"/>
+          <p:cNvSpPr>
+            <a:spLocks noGrp="1"/>
+          </p:cNvSpPr>
+          <p:nvPr>
+            <p:ph type="body" idx="1"/>
+          </p:nvPr>
+        </p:nvSpPr>
+        <p:spPr/>
+        <p:txBody>
+          <a:bodyPr/>
+          <a:lstStyle/>
+          <a:p>
+            <a:r>
+              <a:rPr lang="en-US" dirty="0" smtClean="0"/>
+              <a:t>Day 3: Communication</a:t>
+            </a:r>
+            <a:endParaRPr lang="en-US" dirty="0"/>
+          </a:p>
+        </p:txBody>
+      </p:sp>
+      <p:sp>
+        <p:nvSpPr>
+          <p:cNvPr id="4" name="Content Placeholder 3"/>
+          <p:cNvSpPr>
+            <a:spLocks noGrp="1"/>
+          </p:cNvSpPr>
+          <p:nvPr>
+            <p:ph sz="half" idx="2"/>
+          </p:nvPr>
+        </p:nvSpPr>
+        <p:spPr/>
+        <p:txBody>
+          <a:bodyPr/>
+          <a:lstStyle/>
+          <a:p>
+            <a:r>
+              <a:rPr lang="en-US" dirty="0" smtClean="0"/>
+              <a:t>I/O</a:t>
+            </a:r>
+            <a:endParaRPr lang="en-US" dirty="0"/>
+          </a:p>
+          <a:p>
+            <a:r>
+              <a:rPr lang="en-US" dirty="0" smtClean="0"/>
+              <a:t>Inter </a:t>
+            </a:r>
+            <a:r>
+              <a:rPr lang="en-US" dirty="0"/>
+              <a:t>Process Communication</a:t>
+            </a:r>
+          </a:p>
+          <a:p>
+            <a:r>
+              <a:rPr lang="en-US" dirty="0" smtClean="0"/>
+              <a:t>Sockets </a:t>
+            </a:r>
+            <a:r>
+              <a:rPr lang="en-US" dirty="0"/>
+              <a:t>and </a:t>
+            </a:r>
+            <a:r>
+              <a:rPr lang="en-US" dirty="0" smtClean="0"/>
+              <a:t>Network Communication </a:t>
+            </a:r>
+          </a:p>
+          <a:p>
+            <a:r>
+              <a:rPr lang="en-US" dirty="0" smtClean="0"/>
+              <a:t>Lab </a:t>
+            </a:r>
+            <a:r>
+              <a:rPr lang="en-US" dirty="0"/>
+              <a:t>3: TCP Connection Setup</a:t>
+            </a:r>
+          </a:p>
+        </p:txBody>
+      </p:sp>
+      <p:sp>
+        <p:nvSpPr>
+          <p:cNvPr id="5" name="Text Placeholder 4"/>
+          <p:cNvSpPr>
+            <a:spLocks noGrp="1"/>
+          </p:cNvSpPr>
+          <p:nvPr>
+            <p:ph type="body" sz="quarter" idx="3"/>
+          </p:nvPr>
+        </p:nvSpPr>
+        <p:spPr/>
+        <p:txBody>
+          <a:bodyPr/>
+          <a:lstStyle/>
+          <a:p>
+            <a:r>
+              <a:rPr lang="en-US" dirty="0" smtClean="0"/>
+              <a:t>Day 4: storing data</a:t>
+            </a:r>
+            <a:endParaRPr lang="en-US" dirty="0"/>
+          </a:p>
+        </p:txBody>
+      </p:sp>
+      <p:sp>
+        <p:nvSpPr>
+          <p:cNvPr id="6" name="Content Placeholder 5"/>
+          <p:cNvSpPr>
+            <a:spLocks noGrp="1"/>
+          </p:cNvSpPr>
+          <p:nvPr>
+            <p:ph sz="quarter" idx="4"/>
+          </p:nvPr>
+        </p:nvSpPr>
+        <p:spPr/>
+        <p:txBody>
+          <a:bodyPr/>
+          <a:lstStyle/>
+          <a:p>
+            <a:r>
+              <a:rPr lang="en-US" dirty="0" smtClean="0"/>
+              <a:t>Storage </a:t>
+            </a:r>
+            <a:r>
+              <a:rPr lang="en-US" dirty="0"/>
+              <a:t>Overview</a:t>
+            </a:r>
+          </a:p>
+          <a:p>
+            <a:r>
+              <a:rPr lang="en-US" dirty="0" smtClean="0"/>
+              <a:t>Naming </a:t>
+            </a:r>
+            <a:r>
+              <a:rPr lang="en-US" dirty="0"/>
+              <a:t>and Location</a:t>
+            </a:r>
+          </a:p>
+          <a:p>
+            <a:r>
+              <a:rPr lang="en-US" dirty="0" smtClean="0"/>
+              <a:t>Virtual </a:t>
+            </a:r>
+            <a:r>
+              <a:rPr lang="en-US" dirty="0"/>
+              <a:t>Filesystem Layer</a:t>
+            </a:r>
+          </a:p>
+          <a:p>
+            <a:r>
+              <a:rPr lang="en-US" dirty="0" smtClean="0"/>
+              <a:t>Storing </a:t>
+            </a:r>
+            <a:r>
+              <a:rPr lang="en-US" dirty="0"/>
+              <a:t>and Retrieving Data</a:t>
+            </a:r>
+          </a:p>
+          <a:p>
+            <a:r>
+              <a:rPr lang="en-US" dirty="0" smtClean="0"/>
+              <a:t>Lab </a:t>
+            </a:r>
+            <a:r>
+              <a:rPr lang="en-US" dirty="0"/>
+              <a:t>4: Reading a file from disk</a:t>
+            </a:r>
+          </a:p>
+        </p:txBody>
+      </p:sp>
+      <p:sp>
+        <p:nvSpPr>
+          <p:cNvPr id="7" name="Footer Placeholder 6"/>
+          <p:cNvSpPr>
+            <a:spLocks noGrp="1"/>
+          </p:cNvSpPr>
+          <p:nvPr>
+            <p:ph type="ftr" sz="quarter" idx="11"/>
+          </p:nvPr>
+        </p:nvSpPr>
+        <p:spPr/>
+        <p:txBody>
+          <a:bodyPr/>
+          <a:lstStyle/>
+          <a:p>
+            <a:r>
+              <a:rPr lang="en-US" smtClean="0"/>
+              <a:t>Introduction to Operating Systems</a:t>
+            </a:r>
+            <a:endParaRPr lang="en-US"/>
+          </a:p>
+        </p:txBody>
+      </p:sp>
+    </p:spTree>
+    <p:extLst>
+      <p:ext uri="{BB962C8B-B14F-4D97-AF65-F5344CB8AC3E}">
+        <p14:creationId xmlns:p14="http://schemas.microsoft.com/office/powerpoint/2010/main" val="1573046548"/>
+      </p:ext>
+    </p:extLst>
+  </p:cSld>
+  <p:clrMapOvr>
+    <a:masterClrMapping/>
+  </p:clrMapOvr>
+  <p:timing>
+    <p:tnLst>
+      <p:par>
+        <p:cTn id="1" dur="indefinite" restart="never" nodeType="tmRoot"/>
+      </p:par>
+    </p:tnLst>
+  </p:timing>
+</p:sld>
+</file>
+
+<file path=ppt/slides/slide40.xml><?xml version="1.0" encoding="utf-8"?>
 <p:sld xmlns:a="http://schemas.openxmlformats.org/drawingml/2006/main" xmlns:r="http://schemas.openxmlformats.org/officeDocument/2006/relationships" xmlns:p="http://schemas.openxmlformats.org/presentationml/2006/main">
   <p:cSld>
     <p:spTree>
@@ -8511,256 +11036,7 @@
 </p:sld>
 </file>
 
-<file path=ppt/slides/slide3.xml><?xml version="1.0" encoding="utf-8"?>
-<p:sld xmlns:a="http://schemas.openxmlformats.org/drawingml/2006/main" xmlns:r="http://schemas.openxmlformats.org/officeDocument/2006/relationships" xmlns:p="http://schemas.openxmlformats.org/presentationml/2006/main">
-  <p:cSld>
-    <p:spTree>
-      <p:nvGrpSpPr>
-        <p:cNvPr id="1" name=""/>
-        <p:cNvGrpSpPr/>
-        <p:nvPr/>
-      </p:nvGrpSpPr>
-      <p:grpSpPr>
-        <a:xfrm>
-          <a:off x="0" y="0"/>
-          <a:ext cx="0" cy="0"/>
-          <a:chOff x="0" y="0"/>
-          <a:chExt cx="0" cy="0"/>
-        </a:xfrm>
-      </p:grpSpPr>
-      <p:sp>
-        <p:nvSpPr>
-          <p:cNvPr id="2" name="Title 1"/>
-          <p:cNvSpPr>
-            <a:spLocks noGrp="1"/>
-          </p:cNvSpPr>
-          <p:nvPr>
-            <p:ph type="title"/>
-          </p:nvPr>
-        </p:nvSpPr>
-        <p:spPr/>
-        <p:txBody>
-          <a:bodyPr/>
-          <a:lstStyle/>
-          <a:p>
-            <a:r>
-              <a:rPr lang="en-US" dirty="0" smtClean="0"/>
-              <a:t>Course Outline</a:t>
-            </a:r>
-            <a:endParaRPr lang="en-US" dirty="0"/>
-          </a:p>
-        </p:txBody>
-      </p:sp>
-      <p:sp>
-        <p:nvSpPr>
-          <p:cNvPr id="5" name="Text Placeholder 4"/>
-          <p:cNvSpPr>
-            <a:spLocks noGrp="1"/>
-          </p:cNvSpPr>
-          <p:nvPr>
-            <p:ph type="body" idx="1"/>
-          </p:nvPr>
-        </p:nvSpPr>
-        <p:spPr/>
-        <p:txBody>
-          <a:bodyPr/>
-          <a:lstStyle/>
-          <a:p>
-            <a:r>
-              <a:rPr lang="en-US" dirty="0" smtClean="0"/>
-              <a:t>Day 1</a:t>
-            </a:r>
-            <a:endParaRPr lang="en-US" dirty="0"/>
-          </a:p>
-        </p:txBody>
-      </p:sp>
-      <p:sp>
-        <p:nvSpPr>
-          <p:cNvPr id="6" name="Content Placeholder 5"/>
-          <p:cNvSpPr>
-            <a:spLocks noGrp="1"/>
-          </p:cNvSpPr>
-          <p:nvPr>
-            <p:ph sz="half" idx="2"/>
-          </p:nvPr>
-        </p:nvSpPr>
-        <p:spPr/>
-        <p:txBody>
-          <a:bodyPr/>
-          <a:lstStyle/>
-          <a:p>
-            <a:r>
-              <a:rPr lang="en-US" dirty="0" smtClean="0"/>
-              <a:t>High </a:t>
-            </a:r>
-            <a:r>
-              <a:rPr lang="en-US" dirty="0"/>
-              <a:t>Level Definitions</a:t>
-            </a:r>
-          </a:p>
-          <a:p>
-            <a:r>
-              <a:rPr lang="en-US" dirty="0" smtClean="0"/>
-              <a:t>History</a:t>
-            </a:r>
-            <a:endParaRPr lang="en-US" dirty="0"/>
-          </a:p>
-          <a:p>
-            <a:r>
-              <a:rPr lang="en-US" dirty="0" smtClean="0"/>
-              <a:t>Introduction </a:t>
-            </a:r>
-            <a:r>
-              <a:rPr lang="en-US" dirty="0"/>
-              <a:t>to Tracing</a:t>
-            </a:r>
-          </a:p>
-          <a:p>
-            <a:r>
-              <a:rPr lang="en-US" dirty="0" smtClean="0"/>
-              <a:t>Lab </a:t>
-            </a:r>
-            <a:r>
-              <a:rPr lang="en-US" dirty="0"/>
-              <a:t>1: System Setup and First Traces</a:t>
-            </a:r>
-          </a:p>
-          <a:p>
-            <a:endParaRPr lang="en-US" dirty="0"/>
-          </a:p>
-        </p:txBody>
-      </p:sp>
-      <p:sp>
-        <p:nvSpPr>
-          <p:cNvPr id="7" name="Text Placeholder 6"/>
-          <p:cNvSpPr>
-            <a:spLocks noGrp="1"/>
-          </p:cNvSpPr>
-          <p:nvPr>
-            <p:ph type="body" sz="quarter" idx="3"/>
-          </p:nvPr>
-        </p:nvSpPr>
-        <p:spPr/>
-        <p:txBody>
-          <a:bodyPr/>
-          <a:lstStyle/>
-          <a:p>
-            <a:r>
-              <a:rPr lang="en-US" dirty="0" smtClean="0"/>
-              <a:t>Day 2</a:t>
-            </a:r>
-            <a:endParaRPr lang="en-US" dirty="0"/>
-          </a:p>
-        </p:txBody>
-      </p:sp>
-      <p:sp>
-        <p:nvSpPr>
-          <p:cNvPr id="8" name="Content Placeholder 7"/>
-          <p:cNvSpPr>
-            <a:spLocks noGrp="1"/>
-          </p:cNvSpPr>
-          <p:nvPr>
-            <p:ph sz="quarter" idx="4"/>
-          </p:nvPr>
-        </p:nvSpPr>
-        <p:spPr/>
-        <p:txBody>
-          <a:bodyPr/>
-          <a:lstStyle/>
-          <a:p>
-            <a:r>
-              <a:rPr lang="en-US" dirty="0" smtClean="0"/>
-              <a:t>Quiz</a:t>
-            </a:r>
-            <a:endParaRPr lang="en-US" dirty="0"/>
-          </a:p>
-          <a:p>
-            <a:r>
-              <a:rPr lang="en-US" dirty="0" smtClean="0"/>
-              <a:t>Processes</a:t>
-            </a:r>
-            <a:endParaRPr lang="en-US" dirty="0"/>
-          </a:p>
-          <a:p>
-            <a:r>
-              <a:rPr lang="en-US" dirty="0" smtClean="0"/>
-              <a:t>Locking</a:t>
-            </a:r>
-            <a:endParaRPr lang="en-US" dirty="0"/>
-          </a:p>
-          <a:p>
-            <a:r>
-              <a:rPr lang="en-US" dirty="0" smtClean="0"/>
-              <a:t>Scheduling</a:t>
-            </a:r>
-            <a:endParaRPr lang="en-US" dirty="0"/>
-          </a:p>
-          <a:p>
-            <a:r>
-              <a:rPr lang="en-US" dirty="0" smtClean="0"/>
-              <a:t>Virtual </a:t>
-            </a:r>
-            <a:r>
-              <a:rPr lang="en-US" dirty="0"/>
-              <a:t>Memory</a:t>
-            </a:r>
-          </a:p>
-          <a:p>
-            <a:r>
-              <a:rPr lang="en-US" dirty="0" smtClean="0"/>
-              <a:t>Lab </a:t>
-            </a:r>
-            <a:r>
-              <a:rPr lang="en-US" dirty="0"/>
-              <a:t>2: Tracking Processes</a:t>
-            </a:r>
-          </a:p>
-        </p:txBody>
-      </p:sp>
-      <p:sp>
-        <p:nvSpPr>
-          <p:cNvPr id="4" name="Footer Placeholder 3"/>
-          <p:cNvSpPr>
-            <a:spLocks noGrp="1"/>
-          </p:cNvSpPr>
-          <p:nvPr>
-            <p:ph type="ftr" sz="quarter" idx="11"/>
-          </p:nvPr>
-        </p:nvSpPr>
-        <p:spPr/>
-        <p:txBody>
-          <a:bodyPr/>
-          <a:lstStyle/>
-          <a:p>
-            <a:r>
-              <a:rPr lang="en-US" smtClean="0"/>
-              <a:t>Introduction to Operating Systems</a:t>
-            </a:r>
-            <a:endParaRPr lang="en-US" dirty="0"/>
-          </a:p>
-        </p:txBody>
-      </p:sp>
-    </p:spTree>
-    <p:extLst>
-      <p:ext uri="{BB962C8B-B14F-4D97-AF65-F5344CB8AC3E}">
-        <p14:creationId xmlns:p14="http://schemas.microsoft.com/office/powerpoint/2010/main" val="1691063372"/>
-      </p:ext>
-    </p:extLst>
-  </p:cSld>
-  <p:clrMapOvr>
-    <a:masterClrMapping/>
-  </p:clrMapOvr>
-  <p:timing>
-    <p:tnLst>
-      <p:par>
-        <p:cTn id="1" dur="indefinite" restart="never" nodeType="tmRoot"/>
-      </p:par>
-    </p:tnLst>
-  </p:timing>
-</p:sld>
-</file>
-
-<file path=ppt/slides/slide30.xml><?xml version="1.0" encoding="utf-8"?>
+<file path=ppt/slides/slide41.xml><?xml version="1.0" encoding="utf-8"?>
 <p:sld xmlns:a="http://schemas.openxmlformats.org/drawingml/2006/main" xmlns:r="http://schemas.openxmlformats.org/officeDocument/2006/relationships" xmlns:p="http://schemas.openxmlformats.org/presentationml/2006/main">
   <p:cSld>
     <p:spTree>
@@ -8902,7 +11178,7 @@
 </p:sld>
 </file>
 
-<file path=ppt/slides/slide31.xml><?xml version="1.0" encoding="utf-8"?>
+<file path=ppt/slides/slide42.xml><?xml version="1.0" encoding="utf-8"?>
 <p:sld xmlns:a="http://schemas.openxmlformats.org/drawingml/2006/main" xmlns:r="http://schemas.openxmlformats.org/officeDocument/2006/relationships" xmlns:p="http://schemas.openxmlformats.org/presentationml/2006/main">
   <p:cSld>
     <p:spTree>
@@ -9033,7 +11309,7 @@
 </p:sld>
 </file>
 
-<file path=ppt/slides/slide32.xml><?xml version="1.0" encoding="utf-8"?>
+<file path=ppt/slides/slide43.xml><?xml version="1.0" encoding="utf-8"?>
 <p:sld xmlns:a="http://schemas.openxmlformats.org/drawingml/2006/main" xmlns:r="http://schemas.openxmlformats.org/officeDocument/2006/relationships" xmlns:p="http://schemas.openxmlformats.org/presentationml/2006/main">
   <p:cSld>
     <p:spTree>
@@ -9188,7 +11464,7 @@
 </p:sld>
 </file>
 
-<file path=ppt/slides/slide33.xml><?xml version="1.0" encoding="utf-8"?>
+<file path=ppt/slides/slide44.xml><?xml version="1.0" encoding="utf-8"?>
 <p:sld xmlns:a="http://schemas.openxmlformats.org/drawingml/2006/main" xmlns:r="http://schemas.openxmlformats.org/officeDocument/2006/relationships" xmlns:p="http://schemas.openxmlformats.org/presentationml/2006/main">
   <p:cSld>
     <p:spTree>
@@ -9328,7 +11604,7 @@
 </p:sld>
 </file>
 
-<file path=ppt/slides/slide34.xml><?xml version="1.0" encoding="utf-8"?>
+<file path=ppt/slides/slide45.xml><?xml version="1.0" encoding="utf-8"?>
 <p:sld xmlns:a="http://schemas.openxmlformats.org/drawingml/2006/main" xmlns:r="http://schemas.openxmlformats.org/officeDocument/2006/relationships" xmlns:p="http://schemas.openxmlformats.org/presentationml/2006/main">
   <p:cSld>
     <p:spTree>
@@ -9483,7 +11759,7 @@
 </p:sld>
 </file>
 
-<file path=ppt/slides/slide35.xml><?xml version="1.0" encoding="utf-8"?>
+<file path=ppt/slides/slide46.xml><?xml version="1.0" encoding="utf-8"?>
 <p:sld xmlns:a="http://schemas.openxmlformats.org/drawingml/2006/main" xmlns:r="http://schemas.openxmlformats.org/officeDocument/2006/relationships" xmlns:p="http://schemas.openxmlformats.org/presentationml/2006/main">
   <p:cSld>
     <p:spTree>
@@ -9639,7 +11915,7 @@
 </p:sld>
 </file>
 
-<file path=ppt/slides/slide36.xml><?xml version="1.0" encoding="utf-8"?>
+<file path=ppt/slides/slide47.xml><?xml version="1.0" encoding="utf-8"?>
 <p:sld xmlns:a="http://schemas.openxmlformats.org/drawingml/2006/main" xmlns:r="http://schemas.openxmlformats.org/officeDocument/2006/relationships" xmlns:p="http://schemas.openxmlformats.org/presentationml/2006/main">
   <p:cSld>
     <p:spTree>
@@ -10072,7 +12348,7 @@
 </p:sld>
 </file>
 
-<file path=ppt/slides/slide37.xml><?xml version="1.0" encoding="utf-8"?>
+<file path=ppt/slides/slide48.xml><?xml version="1.0" encoding="utf-8"?>
 <p:sld xmlns:a="http://schemas.openxmlformats.org/drawingml/2006/main" xmlns:r="http://schemas.openxmlformats.org/officeDocument/2006/relationships" xmlns:p="http://schemas.openxmlformats.org/presentationml/2006/main">
   <p:cSld>
     <p:spTree>
@@ -10244,7 +12520,7 @@
 </p:sld>
 </file>
 
-<file path=ppt/slides/slide38.xml><?xml version="1.0" encoding="utf-8"?>
+<file path=ppt/slides/slide49.xml><?xml version="1.0" encoding="utf-8"?>
 <p:sld xmlns:a="http://schemas.openxmlformats.org/drawingml/2006/main" xmlns:r="http://schemas.openxmlformats.org/officeDocument/2006/relationships" xmlns:p="http://schemas.openxmlformats.org/presentationml/2006/main">
   <p:cSld>
     <p:spTree>
@@ -10390,625 +12666,6 @@
     <p:extLst>
       <p:ext uri="{BB962C8B-B14F-4D97-AF65-F5344CB8AC3E}">
         <p14:creationId xmlns:p14="http://schemas.microsoft.com/office/powerpoint/2010/main" val="1106179191"/>
-      </p:ext>
-    </p:extLst>
-  </p:cSld>
-  <p:clrMapOvr>
-    <a:masterClrMapping/>
-  </p:clrMapOvr>
-  <p:timing>
-    <p:tnLst>
-      <p:par>
-        <p:cTn id="1" dur="indefinite" restart="never" nodeType="tmRoot"/>
-      </p:par>
-    </p:tnLst>
-  </p:timing>
-</p:sld>
-</file>
-
-<file path=ppt/slides/slide39.xml><?xml version="1.0" encoding="utf-8"?>
-<p:sld xmlns:a="http://schemas.openxmlformats.org/drawingml/2006/main" xmlns:r="http://schemas.openxmlformats.org/officeDocument/2006/relationships" xmlns:p="http://schemas.openxmlformats.org/presentationml/2006/main">
-  <p:cSld>
-    <p:spTree>
-      <p:nvGrpSpPr>
-        <p:cNvPr id="1" name=""/>
-        <p:cNvGrpSpPr/>
-        <p:nvPr/>
-      </p:nvGrpSpPr>
-      <p:grpSpPr>
-        <a:xfrm>
-          <a:off x="0" y="0"/>
-          <a:ext cx="0" cy="0"/>
-          <a:chOff x="0" y="0"/>
-          <a:chExt cx="0" cy="0"/>
-        </a:xfrm>
-      </p:grpSpPr>
-      <p:sp>
-        <p:nvSpPr>
-          <p:cNvPr id="5" name="Title 4"/>
-          <p:cNvSpPr>
-            <a:spLocks noGrp="1"/>
-          </p:cNvSpPr>
-          <p:nvPr>
-            <p:ph type="title"/>
-          </p:nvPr>
-        </p:nvSpPr>
-        <p:spPr/>
-        <p:txBody>
-          <a:bodyPr/>
-          <a:lstStyle/>
-          <a:p>
-            <a:r>
-              <a:rPr lang="en-US" dirty="0" smtClean="0"/>
-              <a:t>Competing Kernel Architectures</a:t>
-            </a:r>
-            <a:endParaRPr lang="en-US" dirty="0"/>
-          </a:p>
-        </p:txBody>
-      </p:sp>
-      <p:sp>
-        <p:nvSpPr>
-          <p:cNvPr id="6" name="Text Placeholder 5"/>
-          <p:cNvSpPr>
-            <a:spLocks noGrp="1"/>
-          </p:cNvSpPr>
-          <p:nvPr>
-            <p:ph type="body" idx="1"/>
-          </p:nvPr>
-        </p:nvSpPr>
-        <p:spPr/>
-        <p:txBody>
-          <a:bodyPr/>
-          <a:lstStyle/>
-          <a:p>
-            <a:r>
-              <a:rPr lang="en-US" dirty="0" smtClean="0"/>
-              <a:t>Micro-Kernel</a:t>
-            </a:r>
-            <a:endParaRPr lang="en-US" dirty="0"/>
-          </a:p>
-        </p:txBody>
-      </p:sp>
-      <p:sp>
-        <p:nvSpPr>
-          <p:cNvPr id="7" name="Content Placeholder 6"/>
-          <p:cNvSpPr>
-            <a:spLocks noGrp="1"/>
-          </p:cNvSpPr>
-          <p:nvPr>
-            <p:ph sz="half" idx="2"/>
-          </p:nvPr>
-        </p:nvSpPr>
-        <p:spPr/>
-        <p:txBody>
-          <a:bodyPr/>
-          <a:lstStyle/>
-          <a:p>
-            <a:r>
-              <a:rPr lang="en-US" dirty="0" smtClean="0"/>
-              <a:t>Kernel </a:t>
-            </a:r>
-            <a:r>
-              <a:rPr lang="en-US" dirty="0"/>
-              <a:t>is Only a Scheduler</a:t>
-            </a:r>
-          </a:p>
-          <a:p>
-            <a:r>
-              <a:rPr lang="en-US" dirty="0" smtClean="0"/>
-              <a:t>Services </a:t>
-            </a:r>
-            <a:r>
-              <a:rPr lang="en-US" dirty="0"/>
-              <a:t>Model</a:t>
-            </a:r>
-          </a:p>
-          <a:p>
-            <a:r>
-              <a:rPr lang="en-US" dirty="0" smtClean="0"/>
-              <a:t>in-kernel </a:t>
-            </a:r>
-            <a:r>
-              <a:rPr lang="en-US" dirty="0"/>
-              <a:t>IPC</a:t>
-            </a:r>
-          </a:p>
-          <a:p>
-            <a:r>
-              <a:rPr lang="en-US" dirty="0" smtClean="0"/>
-              <a:t>POSIX </a:t>
-            </a:r>
-            <a:r>
-              <a:rPr lang="en-US" dirty="0"/>
-              <a:t>as a service</a:t>
-            </a:r>
-          </a:p>
-          <a:p>
-            <a:r>
-              <a:rPr lang="en-US" dirty="0" smtClean="0"/>
-              <a:t>Mach</a:t>
-            </a:r>
-            <a:r>
-              <a:rPr lang="en-US" dirty="0"/>
-              <a:t>, </a:t>
-            </a:r>
-            <a:r>
-              <a:rPr lang="en-US" dirty="0" err="1"/>
-              <a:t>Barrelfish</a:t>
-            </a:r>
-            <a:r>
-              <a:rPr lang="en-US" dirty="0"/>
-              <a:t>, L4</a:t>
-            </a:r>
-          </a:p>
-        </p:txBody>
-      </p:sp>
-      <p:sp>
-        <p:nvSpPr>
-          <p:cNvPr id="8" name="Text Placeholder 7"/>
-          <p:cNvSpPr>
-            <a:spLocks noGrp="1"/>
-          </p:cNvSpPr>
-          <p:nvPr>
-            <p:ph type="body" sz="quarter" idx="3"/>
-          </p:nvPr>
-        </p:nvSpPr>
-        <p:spPr/>
-        <p:txBody>
-          <a:bodyPr/>
-          <a:lstStyle/>
-          <a:p>
-            <a:r>
-              <a:rPr lang="en-US" dirty="0" smtClean="0"/>
-              <a:t>Monolithic</a:t>
-            </a:r>
-            <a:endParaRPr lang="en-US" dirty="0"/>
-          </a:p>
-        </p:txBody>
-      </p:sp>
-      <p:sp>
-        <p:nvSpPr>
-          <p:cNvPr id="9" name="Content Placeholder 8"/>
-          <p:cNvSpPr>
-            <a:spLocks noGrp="1"/>
-          </p:cNvSpPr>
-          <p:nvPr>
-            <p:ph sz="quarter" idx="4"/>
-          </p:nvPr>
-        </p:nvSpPr>
-        <p:spPr/>
-        <p:txBody>
-          <a:bodyPr/>
-          <a:lstStyle/>
-          <a:p>
-            <a:r>
-              <a:rPr lang="en-US" dirty="0" smtClean="0"/>
-              <a:t>One </a:t>
-            </a:r>
-            <a:r>
-              <a:rPr lang="en-US" dirty="0"/>
-              <a:t>big program </a:t>
-            </a:r>
-            <a:endParaRPr lang="en-US" dirty="0" smtClean="0"/>
-          </a:p>
-          <a:p>
-            <a:r>
-              <a:rPr lang="en-US" dirty="0" smtClean="0"/>
-              <a:t>Function </a:t>
-            </a:r>
-            <a:r>
-              <a:rPr lang="en-US" dirty="0"/>
-              <a:t>Calls</a:t>
-            </a:r>
-          </a:p>
-          <a:p>
-            <a:r>
-              <a:rPr lang="en-US" dirty="0" smtClean="0"/>
-              <a:t>System </a:t>
-            </a:r>
-            <a:r>
-              <a:rPr lang="en-US" dirty="0"/>
-              <a:t>Call API</a:t>
-            </a:r>
-          </a:p>
-          <a:p>
-            <a:r>
-              <a:rPr lang="en-US" dirty="0" smtClean="0"/>
-              <a:t>FreeBSD</a:t>
-            </a:r>
-            <a:r>
-              <a:rPr lang="en-US" dirty="0"/>
-              <a:t>, Linux, Windows</a:t>
-            </a:r>
-          </a:p>
-          <a:p>
-            <a:endParaRPr lang="en-US" dirty="0"/>
-          </a:p>
-        </p:txBody>
-      </p:sp>
-      <p:sp>
-        <p:nvSpPr>
-          <p:cNvPr id="4" name="Footer Placeholder 3"/>
-          <p:cNvSpPr>
-            <a:spLocks noGrp="1"/>
-          </p:cNvSpPr>
-          <p:nvPr>
-            <p:ph type="ftr" sz="quarter" idx="11"/>
-          </p:nvPr>
-        </p:nvSpPr>
-        <p:spPr/>
-        <p:txBody>
-          <a:bodyPr/>
-          <a:lstStyle/>
-          <a:p>
-            <a:r>
-              <a:rPr lang="en-US" smtClean="0"/>
-              <a:t>Introduction to Operating Systems</a:t>
-            </a:r>
-            <a:endParaRPr lang="en-US" dirty="0"/>
-          </a:p>
-        </p:txBody>
-      </p:sp>
-    </p:spTree>
-    <p:extLst>
-      <p:ext uri="{BB962C8B-B14F-4D97-AF65-F5344CB8AC3E}">
-        <p14:creationId xmlns:p14="http://schemas.microsoft.com/office/powerpoint/2010/main" val="528892961"/>
-      </p:ext>
-    </p:extLst>
-  </p:cSld>
-  <p:clrMapOvr>
-    <a:masterClrMapping/>
-  </p:clrMapOvr>
-  <p:timing>
-    <p:tnLst>
-      <p:par>
-        <p:cTn id="1" dur="indefinite" restart="never" nodeType="tmRoot"/>
-      </p:par>
-    </p:tnLst>
-  </p:timing>
-</p:sld>
-</file>
-
-<file path=ppt/slides/slide4.xml><?xml version="1.0" encoding="utf-8"?>
-<p:sld xmlns:a="http://schemas.openxmlformats.org/drawingml/2006/main" xmlns:r="http://schemas.openxmlformats.org/officeDocument/2006/relationships" xmlns:p="http://schemas.openxmlformats.org/presentationml/2006/main">
-  <p:cSld>
-    <p:spTree>
-      <p:nvGrpSpPr>
-        <p:cNvPr id="1" name=""/>
-        <p:cNvGrpSpPr/>
-        <p:nvPr/>
-      </p:nvGrpSpPr>
-      <p:grpSpPr>
-        <a:xfrm>
-          <a:off x="0" y="0"/>
-          <a:ext cx="0" cy="0"/>
-          <a:chOff x="0" y="0"/>
-          <a:chExt cx="0" cy="0"/>
-        </a:xfrm>
-      </p:grpSpPr>
-      <p:sp>
-        <p:nvSpPr>
-          <p:cNvPr id="2" name="Title 1"/>
-          <p:cNvSpPr>
-            <a:spLocks noGrp="1"/>
-          </p:cNvSpPr>
-          <p:nvPr>
-            <p:ph type="title"/>
-          </p:nvPr>
-        </p:nvSpPr>
-        <p:spPr/>
-        <p:txBody>
-          <a:bodyPr/>
-          <a:lstStyle/>
-          <a:p>
-            <a:r>
-              <a:rPr lang="en-US" dirty="0" smtClean="0"/>
-              <a:t>Course Outline</a:t>
-            </a:r>
-            <a:endParaRPr lang="en-US" dirty="0"/>
-          </a:p>
-        </p:txBody>
-      </p:sp>
-      <p:sp>
-        <p:nvSpPr>
-          <p:cNvPr id="3" name="Text Placeholder 2"/>
-          <p:cNvSpPr>
-            <a:spLocks noGrp="1"/>
-          </p:cNvSpPr>
-          <p:nvPr>
-            <p:ph type="body" idx="1"/>
-          </p:nvPr>
-        </p:nvSpPr>
-        <p:spPr/>
-        <p:txBody>
-          <a:bodyPr/>
-          <a:lstStyle/>
-          <a:p>
-            <a:r>
-              <a:rPr lang="en-US" dirty="0" smtClean="0"/>
-              <a:t>Day 3: Communication</a:t>
-            </a:r>
-            <a:endParaRPr lang="en-US" dirty="0"/>
-          </a:p>
-        </p:txBody>
-      </p:sp>
-      <p:sp>
-        <p:nvSpPr>
-          <p:cNvPr id="4" name="Content Placeholder 3"/>
-          <p:cNvSpPr>
-            <a:spLocks noGrp="1"/>
-          </p:cNvSpPr>
-          <p:nvPr>
-            <p:ph sz="half" idx="2"/>
-          </p:nvPr>
-        </p:nvSpPr>
-        <p:spPr/>
-        <p:txBody>
-          <a:bodyPr/>
-          <a:lstStyle/>
-          <a:p>
-            <a:r>
-              <a:rPr lang="en-US" dirty="0" smtClean="0"/>
-              <a:t>I/O</a:t>
-            </a:r>
-            <a:endParaRPr lang="en-US" dirty="0"/>
-          </a:p>
-          <a:p>
-            <a:r>
-              <a:rPr lang="en-US" dirty="0" smtClean="0"/>
-              <a:t>Inter </a:t>
-            </a:r>
-            <a:r>
-              <a:rPr lang="en-US" dirty="0"/>
-              <a:t>Process Communication</a:t>
-            </a:r>
-          </a:p>
-          <a:p>
-            <a:r>
-              <a:rPr lang="en-US" dirty="0" smtClean="0"/>
-              <a:t>Sockets </a:t>
-            </a:r>
-            <a:r>
-              <a:rPr lang="en-US" dirty="0"/>
-              <a:t>and </a:t>
-            </a:r>
-            <a:r>
-              <a:rPr lang="en-US" dirty="0" smtClean="0"/>
-              <a:t>Network Communication </a:t>
-            </a:r>
-          </a:p>
-          <a:p>
-            <a:r>
-              <a:rPr lang="en-US" dirty="0" smtClean="0"/>
-              <a:t>Lab </a:t>
-            </a:r>
-            <a:r>
-              <a:rPr lang="en-US" dirty="0"/>
-              <a:t>3: TCP Connection Setup</a:t>
-            </a:r>
-          </a:p>
-        </p:txBody>
-      </p:sp>
-      <p:sp>
-        <p:nvSpPr>
-          <p:cNvPr id="5" name="Text Placeholder 4"/>
-          <p:cNvSpPr>
-            <a:spLocks noGrp="1"/>
-          </p:cNvSpPr>
-          <p:nvPr>
-            <p:ph type="body" sz="quarter" idx="3"/>
-          </p:nvPr>
-        </p:nvSpPr>
-        <p:spPr/>
-        <p:txBody>
-          <a:bodyPr/>
-          <a:lstStyle/>
-          <a:p>
-            <a:r>
-              <a:rPr lang="en-US" dirty="0" smtClean="0"/>
-              <a:t>Day 4: storing data</a:t>
-            </a:r>
-            <a:endParaRPr lang="en-US" dirty="0"/>
-          </a:p>
-        </p:txBody>
-      </p:sp>
-      <p:sp>
-        <p:nvSpPr>
-          <p:cNvPr id="6" name="Content Placeholder 5"/>
-          <p:cNvSpPr>
-            <a:spLocks noGrp="1"/>
-          </p:cNvSpPr>
-          <p:nvPr>
-            <p:ph sz="quarter" idx="4"/>
-          </p:nvPr>
-        </p:nvSpPr>
-        <p:spPr/>
-        <p:txBody>
-          <a:bodyPr/>
-          <a:lstStyle/>
-          <a:p>
-            <a:r>
-              <a:rPr lang="en-US" dirty="0" smtClean="0"/>
-              <a:t>Storage </a:t>
-            </a:r>
-            <a:r>
-              <a:rPr lang="en-US" dirty="0"/>
-              <a:t>Overview</a:t>
-            </a:r>
-          </a:p>
-          <a:p>
-            <a:r>
-              <a:rPr lang="en-US" dirty="0" smtClean="0"/>
-              <a:t>Naming </a:t>
-            </a:r>
-            <a:r>
-              <a:rPr lang="en-US" dirty="0"/>
-              <a:t>and Location</a:t>
-            </a:r>
-          </a:p>
-          <a:p>
-            <a:r>
-              <a:rPr lang="en-US" dirty="0" smtClean="0"/>
-              <a:t>Virtual </a:t>
-            </a:r>
-            <a:r>
-              <a:rPr lang="en-US" dirty="0"/>
-              <a:t>Filesystem Layer</a:t>
-            </a:r>
-          </a:p>
-          <a:p>
-            <a:r>
-              <a:rPr lang="en-US" dirty="0" smtClean="0"/>
-              <a:t>Storing </a:t>
-            </a:r>
-            <a:r>
-              <a:rPr lang="en-US" dirty="0"/>
-              <a:t>and Retrieving Data</a:t>
-            </a:r>
-          </a:p>
-          <a:p>
-            <a:r>
-              <a:rPr lang="en-US" dirty="0" smtClean="0"/>
-              <a:t>Lab </a:t>
-            </a:r>
-            <a:r>
-              <a:rPr lang="en-US" dirty="0"/>
-              <a:t>4: Reading a file from disk</a:t>
-            </a:r>
-          </a:p>
-        </p:txBody>
-      </p:sp>
-      <p:sp>
-        <p:nvSpPr>
-          <p:cNvPr id="7" name="Footer Placeholder 6"/>
-          <p:cNvSpPr>
-            <a:spLocks noGrp="1"/>
-          </p:cNvSpPr>
-          <p:nvPr>
-            <p:ph type="ftr" sz="quarter" idx="11"/>
-          </p:nvPr>
-        </p:nvSpPr>
-        <p:spPr/>
-        <p:txBody>
-          <a:bodyPr/>
-          <a:lstStyle/>
-          <a:p>
-            <a:r>
-              <a:rPr lang="en-US" smtClean="0"/>
-              <a:t>Introduction to Operating Systems</a:t>
-            </a:r>
-            <a:endParaRPr lang="en-US"/>
-          </a:p>
-        </p:txBody>
-      </p:sp>
-    </p:spTree>
-    <p:extLst>
-      <p:ext uri="{BB962C8B-B14F-4D97-AF65-F5344CB8AC3E}">
-        <p14:creationId xmlns:p14="http://schemas.microsoft.com/office/powerpoint/2010/main" val="1573046548"/>
-      </p:ext>
-    </p:extLst>
-  </p:cSld>
-  <p:clrMapOvr>
-    <a:masterClrMapping/>
-  </p:clrMapOvr>
-  <p:timing>
-    <p:tnLst>
-      <p:par>
-        <p:cTn id="1" dur="indefinite" restart="never" nodeType="tmRoot"/>
-      </p:par>
-    </p:tnLst>
-  </p:timing>
-</p:sld>
-</file>
-
-<file path=ppt/slides/slide40.xml><?xml version="1.0" encoding="utf-8"?>
-<p:sld xmlns:a="http://schemas.openxmlformats.org/drawingml/2006/main" xmlns:r="http://schemas.openxmlformats.org/officeDocument/2006/relationships" xmlns:p="http://schemas.openxmlformats.org/presentationml/2006/main">
-  <p:cSld>
-    <p:spTree>
-      <p:nvGrpSpPr>
-        <p:cNvPr id="1" name=""/>
-        <p:cNvGrpSpPr/>
-        <p:nvPr/>
-      </p:nvGrpSpPr>
-      <p:grpSpPr>
-        <a:xfrm>
-          <a:off x="0" y="0"/>
-          <a:ext cx="0" cy="0"/>
-          <a:chOff x="0" y="0"/>
-          <a:chExt cx="0" cy="0"/>
-        </a:xfrm>
-      </p:grpSpPr>
-      <p:sp>
-        <p:nvSpPr>
-          <p:cNvPr id="8" name="Title 7"/>
-          <p:cNvSpPr>
-            <a:spLocks noGrp="1"/>
-          </p:cNvSpPr>
-          <p:nvPr>
-            <p:ph type="title"/>
-          </p:nvPr>
-        </p:nvSpPr>
-        <p:spPr/>
-        <p:txBody>
-          <a:bodyPr>
-            <a:normAutofit fontScale="90000"/>
-          </a:bodyPr>
-          <a:lstStyle/>
-          <a:p>
-            <a:r>
-              <a:rPr lang="en-US" dirty="0" smtClean="0"/>
-              <a:t>Review: What an Operating System Does</a:t>
-            </a:r>
-            <a:endParaRPr lang="en-US" dirty="0"/>
-          </a:p>
-        </p:txBody>
-      </p:sp>
-      <p:sp>
-        <p:nvSpPr>
-          <p:cNvPr id="9" name="Content Placeholder 8"/>
-          <p:cNvSpPr>
-            <a:spLocks noGrp="1"/>
-          </p:cNvSpPr>
-          <p:nvPr>
-            <p:ph idx="1"/>
-          </p:nvPr>
-        </p:nvSpPr>
-        <p:spPr/>
-        <p:txBody>
-          <a:bodyPr/>
-          <a:lstStyle/>
-          <a:p>
-            <a:endParaRPr lang="en-US" dirty="0"/>
-          </a:p>
-        </p:txBody>
-      </p:sp>
-      <p:sp>
-        <p:nvSpPr>
-          <p:cNvPr id="7" name="Footer Placeholder 6"/>
-          <p:cNvSpPr>
-            <a:spLocks noGrp="1"/>
-          </p:cNvSpPr>
-          <p:nvPr>
-            <p:ph type="ftr" sz="quarter" idx="11"/>
-          </p:nvPr>
-        </p:nvSpPr>
-        <p:spPr/>
-        <p:txBody>
-          <a:bodyPr/>
-          <a:lstStyle/>
-          <a:p>
-            <a:r>
-              <a:rPr lang="en-US" smtClean="0"/>
-              <a:t>Introduction to Operating Systems</a:t>
-            </a:r>
-            <a:endParaRPr lang="en-US"/>
-          </a:p>
-        </p:txBody>
-      </p:sp>
-    </p:spTree>
-    <p:extLst>
-      <p:ext uri="{BB962C8B-B14F-4D97-AF65-F5344CB8AC3E}">
-        <p14:creationId xmlns:p14="http://schemas.microsoft.com/office/powerpoint/2010/main" val="672727637"/>
       </p:ext>
     </p:extLst>
   </p:cSld>
@@ -11212,6 +12869,373 @@
   <p:clrMapOvr>
     <a:masterClrMapping/>
   </p:clrMapOvr>
+</p:sld>
+</file>
+
+<file path=ppt/slides/slide50.xml><?xml version="1.0" encoding="utf-8"?>
+<p:sld xmlns:a="http://schemas.openxmlformats.org/drawingml/2006/main" xmlns:r="http://schemas.openxmlformats.org/officeDocument/2006/relationships" xmlns:p="http://schemas.openxmlformats.org/presentationml/2006/main">
+  <p:cSld>
+    <p:spTree>
+      <p:nvGrpSpPr>
+        <p:cNvPr id="1" name=""/>
+        <p:cNvGrpSpPr/>
+        <p:nvPr/>
+      </p:nvGrpSpPr>
+      <p:grpSpPr>
+        <a:xfrm>
+          <a:off x="0" y="0"/>
+          <a:ext cx="0" cy="0"/>
+          <a:chOff x="0" y="0"/>
+          <a:chExt cx="0" cy="0"/>
+        </a:xfrm>
+      </p:grpSpPr>
+      <p:sp>
+        <p:nvSpPr>
+          <p:cNvPr id="5" name="Title 4"/>
+          <p:cNvSpPr>
+            <a:spLocks noGrp="1"/>
+          </p:cNvSpPr>
+          <p:nvPr>
+            <p:ph type="title"/>
+          </p:nvPr>
+        </p:nvSpPr>
+        <p:spPr/>
+        <p:txBody>
+          <a:bodyPr/>
+          <a:lstStyle/>
+          <a:p>
+            <a:r>
+              <a:rPr lang="en-US" dirty="0" smtClean="0"/>
+              <a:t>Competing Kernel Architectures</a:t>
+            </a:r>
+            <a:endParaRPr lang="en-US" dirty="0"/>
+          </a:p>
+        </p:txBody>
+      </p:sp>
+      <p:sp>
+        <p:nvSpPr>
+          <p:cNvPr id="6" name="Text Placeholder 5"/>
+          <p:cNvSpPr>
+            <a:spLocks noGrp="1"/>
+          </p:cNvSpPr>
+          <p:nvPr>
+            <p:ph type="body" idx="1"/>
+          </p:nvPr>
+        </p:nvSpPr>
+        <p:spPr/>
+        <p:txBody>
+          <a:bodyPr/>
+          <a:lstStyle/>
+          <a:p>
+            <a:r>
+              <a:rPr lang="en-US" dirty="0" smtClean="0"/>
+              <a:t>Micro-Kernel</a:t>
+            </a:r>
+            <a:endParaRPr lang="en-US" dirty="0"/>
+          </a:p>
+        </p:txBody>
+      </p:sp>
+      <p:sp>
+        <p:nvSpPr>
+          <p:cNvPr id="7" name="Content Placeholder 6"/>
+          <p:cNvSpPr>
+            <a:spLocks noGrp="1"/>
+          </p:cNvSpPr>
+          <p:nvPr>
+            <p:ph sz="half" idx="2"/>
+          </p:nvPr>
+        </p:nvSpPr>
+        <p:spPr/>
+        <p:txBody>
+          <a:bodyPr/>
+          <a:lstStyle/>
+          <a:p>
+            <a:r>
+              <a:rPr lang="en-US" dirty="0" smtClean="0"/>
+              <a:t>Kernel </a:t>
+            </a:r>
+            <a:r>
+              <a:rPr lang="en-US" dirty="0"/>
+              <a:t>is Only a Scheduler</a:t>
+            </a:r>
+          </a:p>
+          <a:p>
+            <a:r>
+              <a:rPr lang="en-US" dirty="0" smtClean="0"/>
+              <a:t>Services </a:t>
+            </a:r>
+            <a:r>
+              <a:rPr lang="en-US" dirty="0"/>
+              <a:t>Model</a:t>
+            </a:r>
+          </a:p>
+          <a:p>
+            <a:r>
+              <a:rPr lang="en-US" dirty="0" smtClean="0"/>
+              <a:t>in-kernel </a:t>
+            </a:r>
+            <a:r>
+              <a:rPr lang="en-US" dirty="0"/>
+              <a:t>IPC</a:t>
+            </a:r>
+          </a:p>
+          <a:p>
+            <a:r>
+              <a:rPr lang="en-US" dirty="0" smtClean="0"/>
+              <a:t>POSIX </a:t>
+            </a:r>
+            <a:r>
+              <a:rPr lang="en-US" dirty="0"/>
+              <a:t>as a service</a:t>
+            </a:r>
+          </a:p>
+          <a:p>
+            <a:r>
+              <a:rPr lang="en-US" dirty="0" smtClean="0"/>
+              <a:t>Mach</a:t>
+            </a:r>
+            <a:r>
+              <a:rPr lang="en-US" dirty="0"/>
+              <a:t>, </a:t>
+            </a:r>
+            <a:r>
+              <a:rPr lang="en-US" dirty="0" err="1"/>
+              <a:t>Barrelfish</a:t>
+            </a:r>
+            <a:r>
+              <a:rPr lang="en-US" dirty="0"/>
+              <a:t>, L4</a:t>
+            </a:r>
+          </a:p>
+        </p:txBody>
+      </p:sp>
+      <p:sp>
+        <p:nvSpPr>
+          <p:cNvPr id="8" name="Text Placeholder 7"/>
+          <p:cNvSpPr>
+            <a:spLocks noGrp="1"/>
+          </p:cNvSpPr>
+          <p:nvPr>
+            <p:ph type="body" sz="quarter" idx="3"/>
+          </p:nvPr>
+        </p:nvSpPr>
+        <p:spPr/>
+        <p:txBody>
+          <a:bodyPr/>
+          <a:lstStyle/>
+          <a:p>
+            <a:r>
+              <a:rPr lang="en-US" dirty="0" smtClean="0"/>
+              <a:t>Monolithic</a:t>
+            </a:r>
+            <a:endParaRPr lang="en-US" dirty="0"/>
+          </a:p>
+        </p:txBody>
+      </p:sp>
+      <p:sp>
+        <p:nvSpPr>
+          <p:cNvPr id="9" name="Content Placeholder 8"/>
+          <p:cNvSpPr>
+            <a:spLocks noGrp="1"/>
+          </p:cNvSpPr>
+          <p:nvPr>
+            <p:ph sz="quarter" idx="4"/>
+          </p:nvPr>
+        </p:nvSpPr>
+        <p:spPr/>
+        <p:txBody>
+          <a:bodyPr/>
+          <a:lstStyle/>
+          <a:p>
+            <a:r>
+              <a:rPr lang="en-US" dirty="0" smtClean="0"/>
+              <a:t>One </a:t>
+            </a:r>
+            <a:r>
+              <a:rPr lang="en-US" dirty="0"/>
+              <a:t>big program </a:t>
+            </a:r>
+            <a:endParaRPr lang="en-US" dirty="0" smtClean="0"/>
+          </a:p>
+          <a:p>
+            <a:r>
+              <a:rPr lang="en-US" dirty="0" smtClean="0"/>
+              <a:t>Function </a:t>
+            </a:r>
+            <a:r>
+              <a:rPr lang="en-US" dirty="0"/>
+              <a:t>Calls</a:t>
+            </a:r>
+          </a:p>
+          <a:p>
+            <a:r>
+              <a:rPr lang="en-US" dirty="0" smtClean="0"/>
+              <a:t>System </a:t>
+            </a:r>
+            <a:r>
+              <a:rPr lang="en-US" dirty="0"/>
+              <a:t>Call API</a:t>
+            </a:r>
+          </a:p>
+          <a:p>
+            <a:r>
+              <a:rPr lang="en-US" dirty="0" smtClean="0"/>
+              <a:t>FreeBSD</a:t>
+            </a:r>
+            <a:r>
+              <a:rPr lang="en-US" dirty="0"/>
+              <a:t>, Linux, Windows</a:t>
+            </a:r>
+          </a:p>
+          <a:p>
+            <a:endParaRPr lang="en-US" dirty="0"/>
+          </a:p>
+        </p:txBody>
+      </p:sp>
+      <p:sp>
+        <p:nvSpPr>
+          <p:cNvPr id="4" name="Footer Placeholder 3"/>
+          <p:cNvSpPr>
+            <a:spLocks noGrp="1"/>
+          </p:cNvSpPr>
+          <p:nvPr>
+            <p:ph type="ftr" sz="quarter" idx="11"/>
+          </p:nvPr>
+        </p:nvSpPr>
+        <p:spPr/>
+        <p:txBody>
+          <a:bodyPr/>
+          <a:lstStyle/>
+          <a:p>
+            <a:r>
+              <a:rPr lang="en-US" smtClean="0"/>
+              <a:t>Introduction to Operating Systems</a:t>
+            </a:r>
+            <a:endParaRPr lang="en-US" dirty="0"/>
+          </a:p>
+        </p:txBody>
+      </p:sp>
+    </p:spTree>
+    <p:extLst>
+      <p:ext uri="{BB962C8B-B14F-4D97-AF65-F5344CB8AC3E}">
+        <p14:creationId xmlns:p14="http://schemas.microsoft.com/office/powerpoint/2010/main" val="528892961"/>
+      </p:ext>
+    </p:extLst>
+  </p:cSld>
+  <p:clrMapOvr>
+    <a:masterClrMapping/>
+  </p:clrMapOvr>
+  <p:timing>
+    <p:tnLst>
+      <p:par>
+        <p:cTn id="1" dur="indefinite" restart="never" nodeType="tmRoot"/>
+      </p:par>
+    </p:tnLst>
+  </p:timing>
+</p:sld>
+</file>
+
+<file path=ppt/slides/slide51.xml><?xml version="1.0" encoding="utf-8"?>
+<p:sld xmlns:a="http://schemas.openxmlformats.org/drawingml/2006/main" xmlns:r="http://schemas.openxmlformats.org/officeDocument/2006/relationships" xmlns:p="http://schemas.openxmlformats.org/presentationml/2006/main">
+  <p:cSld>
+    <p:spTree>
+      <p:nvGrpSpPr>
+        <p:cNvPr id="1" name=""/>
+        <p:cNvGrpSpPr/>
+        <p:nvPr/>
+      </p:nvGrpSpPr>
+      <p:grpSpPr>
+        <a:xfrm>
+          <a:off x="0" y="0"/>
+          <a:ext cx="0" cy="0"/>
+          <a:chOff x="0" y="0"/>
+          <a:chExt cx="0" cy="0"/>
+        </a:xfrm>
+      </p:grpSpPr>
+      <p:sp>
+        <p:nvSpPr>
+          <p:cNvPr id="8" name="Title 7"/>
+          <p:cNvSpPr>
+            <a:spLocks noGrp="1"/>
+          </p:cNvSpPr>
+          <p:nvPr>
+            <p:ph type="title"/>
+          </p:nvPr>
+        </p:nvSpPr>
+        <p:spPr/>
+        <p:txBody>
+          <a:bodyPr>
+            <a:normAutofit fontScale="90000"/>
+          </a:bodyPr>
+          <a:lstStyle/>
+          <a:p>
+            <a:r>
+              <a:rPr lang="en-US" dirty="0" smtClean="0"/>
+              <a:t>Review: What an Operating System Does</a:t>
+            </a:r>
+            <a:endParaRPr lang="en-US" dirty="0"/>
+          </a:p>
+        </p:txBody>
+      </p:sp>
+      <p:sp>
+        <p:nvSpPr>
+          <p:cNvPr id="9" name="Content Placeholder 8"/>
+          <p:cNvSpPr>
+            <a:spLocks noGrp="1"/>
+          </p:cNvSpPr>
+          <p:nvPr>
+            <p:ph idx="1"/>
+          </p:nvPr>
+        </p:nvSpPr>
+        <p:spPr/>
+        <p:txBody>
+          <a:bodyPr/>
+          <a:lstStyle/>
+          <a:p>
+            <a:endParaRPr lang="en-US" dirty="0"/>
+          </a:p>
+        </p:txBody>
+      </p:sp>
+      <p:sp>
+        <p:nvSpPr>
+          <p:cNvPr id="7" name="Footer Placeholder 6"/>
+          <p:cNvSpPr>
+            <a:spLocks noGrp="1"/>
+          </p:cNvSpPr>
+          <p:nvPr>
+            <p:ph type="ftr" sz="quarter" idx="11"/>
+          </p:nvPr>
+        </p:nvSpPr>
+        <p:spPr/>
+        <p:txBody>
+          <a:bodyPr/>
+          <a:lstStyle/>
+          <a:p>
+            <a:r>
+              <a:rPr lang="en-US" smtClean="0"/>
+              <a:t>Introduction to Operating Systems</a:t>
+            </a:r>
+            <a:endParaRPr lang="en-US"/>
+          </a:p>
+        </p:txBody>
+      </p:sp>
+    </p:spTree>
+    <p:extLst>
+      <p:ext uri="{BB962C8B-B14F-4D97-AF65-F5344CB8AC3E}">
+        <p14:creationId xmlns:p14="http://schemas.microsoft.com/office/powerpoint/2010/main" val="672727637"/>
+      </p:ext>
+    </p:extLst>
+  </p:cSld>
+  <p:clrMapOvr>
+    <a:masterClrMapping/>
+  </p:clrMapOvr>
+  <p:timing>
+    <p:tnLst>
+      <p:par>
+        <p:cTn id="1" dur="indefinite" restart="never" nodeType="tmRoot"/>
+      </p:par>
+    </p:tnLst>
+  </p:timing>
 </p:sld>
 </file>
 

</xml_diff>